<commit_message>
adding the rounded rectangle to the pptx
</commit_message>
<xml_diff>
--- a/rectangleRotation.pptx
+++ b/rectangleRotation.pptx
@@ -6,6 +6,8 @@
   </p:sldMasterIdLst>
   <p:sldIdLst>
     <p:sldId id="256" r:id="rId2"/>
+    <p:sldId id="257" r:id="rId3"/>
+    <p:sldId id="259" r:id="rId4"/>
   </p:sldIdLst>
   <p:sldSz cx="12192000" cy="6858000"/>
   <p:notesSz cx="6858000" cy="9144000"/>
@@ -104,6 +106,11 @@
       </a:defRPr>
     </a:lvl9pPr>
   </p:defaultTextStyle>
+  <p:extLst>
+    <p:ext uri="{EFAFB233-063F-42B5-8137-9DF3F51BA10A}">
+      <p15:sldGuideLst xmlns:p15="http://schemas.microsoft.com/office/powerpoint/2012/main"/>
+    </p:ext>
+  </p:extLst>
 </p:presentation>
 </file>
 
@@ -4037,8 +4044,8 @@
           </a:p>
         </p:txBody>
       </p:sp>
-      <mc:AlternateContent xmlns:mc="http://schemas.openxmlformats.org/markup-compatibility/2006">
-        <mc:Choice xmlns:a14="http://schemas.microsoft.com/office/drawing/2010/main" Requires="a14">
+      <mc:AlternateContent xmlns:mc="http://schemas.openxmlformats.org/markup-compatibility/2006" xmlns:a14="http://schemas.microsoft.com/office/drawing/2010/main">
+        <mc:Choice Requires="a14">
           <p:sp>
             <p:nvSpPr>
               <p:cNvPr id="32" name="TextBox 31">
@@ -4067,6 +4074,7 @@
               </a:bodyPr>
               <a:lstStyle/>
               <a:p>
+                <a:pPr/>
                 <a14:m>
                   <m:oMathPara xmlns:m="http://schemas.openxmlformats.org/officeDocument/2006/math">
                     <m:oMathParaPr>
@@ -4275,7 +4283,7 @@
             </p:txBody>
           </p:sp>
         </mc:Choice>
-        <mc:Fallback>
+        <mc:Fallback xmlns="">
           <p:sp>
             <p:nvSpPr>
               <p:cNvPr id="32" name="TextBox 31">
@@ -4436,8 +4444,8 @@
           </a:p>
         </p:txBody>
       </p:sp>
-      <mc:AlternateContent xmlns:mc="http://schemas.openxmlformats.org/markup-compatibility/2006">
-        <mc:Choice xmlns:a14="http://schemas.microsoft.com/office/drawing/2010/main" Requires="a14">
+      <mc:AlternateContent xmlns:mc="http://schemas.openxmlformats.org/markup-compatibility/2006" xmlns:a14="http://schemas.microsoft.com/office/drawing/2010/main">
+        <mc:Choice Requires="a14">
           <p:sp>
             <p:nvSpPr>
               <p:cNvPr id="35" name="TextBox 34">
@@ -4466,6 +4474,7 @@
               </a:bodyPr>
               <a:lstStyle/>
               <a:p>
+                <a:pPr/>
                 <a14:m>
                   <m:oMathPara xmlns:m="http://schemas.openxmlformats.org/officeDocument/2006/math">
                     <m:oMathParaPr>
@@ -4597,7 +4606,7 @@
             </p:txBody>
           </p:sp>
         </mc:Choice>
-        <mc:Fallback>
+        <mc:Fallback xmlns="">
           <p:sp>
             <p:nvSpPr>
               <p:cNvPr id="35" name="TextBox 34">
@@ -4723,6 +4732,3082 @@
     <p:extLst>
       <p:ext uri="{BB962C8B-B14F-4D97-AF65-F5344CB8AC3E}">
         <p14:creationId xmlns:p14="http://schemas.microsoft.com/office/powerpoint/2010/main" val="3138714147"/>
+      </p:ext>
+    </p:extLst>
+  </p:cSld>
+  <p:clrMapOvr>
+    <a:masterClrMapping/>
+  </p:clrMapOvr>
+</p:sld>
+</file>
+
+<file path=ppt/slides/slide2.xml><?xml version="1.0" encoding="utf-8"?>
+<p:sld xmlns:a="http://schemas.openxmlformats.org/drawingml/2006/main" xmlns:r="http://schemas.openxmlformats.org/officeDocument/2006/relationships" xmlns:p="http://schemas.openxmlformats.org/presentationml/2006/main">
+  <p:cSld>
+    <p:spTree>
+      <p:nvGrpSpPr>
+        <p:cNvPr id="1" name=""/>
+        <p:cNvGrpSpPr/>
+        <p:nvPr/>
+      </p:nvGrpSpPr>
+      <p:grpSpPr>
+        <a:xfrm>
+          <a:off x="0" y="0"/>
+          <a:ext cx="0" cy="0"/>
+          <a:chOff x="0" y="0"/>
+          <a:chExt cx="0" cy="0"/>
+        </a:xfrm>
+      </p:grpSpPr>
+      <p:sp>
+        <p:nvSpPr>
+          <p:cNvPr id="2" name="Oval 1">
+            <a:extLst>
+              <a:ext uri="{FF2B5EF4-FFF2-40B4-BE49-F238E27FC236}">
+                <a16:creationId xmlns:a16="http://schemas.microsoft.com/office/drawing/2014/main" id="{74E0C557-0DEF-4F4A-9CD1-02BC0B4C6643}"/>
+              </a:ext>
+            </a:extLst>
+          </p:cNvPr>
+          <p:cNvSpPr/>
+          <p:nvPr/>
+        </p:nvSpPr>
+        <p:spPr>
+          <a:xfrm>
+            <a:off x="3931920" y="871777"/>
+            <a:ext cx="3511296" cy="3511296"/>
+          </a:xfrm>
+          <a:prstGeom prst="ellipse">
+            <a:avLst/>
+          </a:prstGeom>
+          <a:noFill/>
+          <a:ln>
+            <a:solidFill>
+              <a:schemeClr val="accent1"/>
+            </a:solidFill>
+          </a:ln>
+        </p:spPr>
+        <p:style>
+          <a:lnRef idx="2">
+            <a:schemeClr val="accent1">
+              <a:shade val="50000"/>
+            </a:schemeClr>
+          </a:lnRef>
+          <a:fillRef idx="1">
+            <a:schemeClr val="accent1"/>
+          </a:fillRef>
+          <a:effectRef idx="0">
+            <a:schemeClr val="accent1"/>
+          </a:effectRef>
+          <a:fontRef idx="minor">
+            <a:schemeClr val="lt1"/>
+          </a:fontRef>
+        </p:style>
+        <p:txBody>
+          <a:bodyPr rtlCol="0" anchor="ctr"/>
+          <a:lstStyle/>
+          <a:p>
+            <a:pPr algn="ctr"/>
+            <a:endParaRPr lang="de-DE"/>
+          </a:p>
+        </p:txBody>
+      </p:sp>
+      <p:cxnSp>
+        <p:nvCxnSpPr>
+          <p:cNvPr id="4" name="Straight Connector 3">
+            <a:extLst>
+              <a:ext uri="{FF2B5EF4-FFF2-40B4-BE49-F238E27FC236}">
+                <a16:creationId xmlns:a16="http://schemas.microsoft.com/office/drawing/2014/main" id="{ACAA66F4-C28B-8647-9BBE-B89596E5A80C}"/>
+              </a:ext>
+            </a:extLst>
+          </p:cNvPr>
+          <p:cNvCxnSpPr/>
+          <p:nvPr/>
+        </p:nvCxnSpPr>
+        <p:spPr>
+          <a:xfrm>
+            <a:off x="2231136" y="4701567"/>
+            <a:ext cx="8311896" cy="0"/>
+          </a:xfrm>
+          <a:prstGeom prst="line">
+            <a:avLst/>
+          </a:prstGeom>
+          <a:ln w="12700">
+            <a:solidFill>
+              <a:schemeClr val="tx1"/>
+            </a:solidFill>
+          </a:ln>
+        </p:spPr>
+        <p:style>
+          <a:lnRef idx="1">
+            <a:schemeClr val="accent1"/>
+          </a:lnRef>
+          <a:fillRef idx="0">
+            <a:schemeClr val="accent1"/>
+          </a:fillRef>
+          <a:effectRef idx="0">
+            <a:schemeClr val="accent1"/>
+          </a:effectRef>
+          <a:fontRef idx="minor">
+            <a:schemeClr val="tx1"/>
+          </a:fontRef>
+        </p:style>
+      </p:cxnSp>
+      <p:sp>
+        <p:nvSpPr>
+          <p:cNvPr id="5" name="Rectangle 4">
+            <a:extLst>
+              <a:ext uri="{FF2B5EF4-FFF2-40B4-BE49-F238E27FC236}">
+                <a16:creationId xmlns:a16="http://schemas.microsoft.com/office/drawing/2014/main" id="{CBD186FE-6D75-5B48-A9C8-B105FC7FCE4A}"/>
+              </a:ext>
+            </a:extLst>
+          </p:cNvPr>
+          <p:cNvSpPr/>
+          <p:nvPr/>
+        </p:nvSpPr>
+        <p:spPr>
+          <a:xfrm rot="685106">
+            <a:off x="1784397" y="375257"/>
+            <a:ext cx="5708908" cy="3798780"/>
+          </a:xfrm>
+          <a:prstGeom prst="rect">
+            <a:avLst/>
+          </a:prstGeom>
+          <a:noFill/>
+          <a:ln>
+            <a:solidFill>
+              <a:schemeClr val="tx1"/>
+            </a:solidFill>
+          </a:ln>
+        </p:spPr>
+        <p:style>
+          <a:lnRef idx="2">
+            <a:schemeClr val="accent1">
+              <a:shade val="50000"/>
+            </a:schemeClr>
+          </a:lnRef>
+          <a:fillRef idx="1">
+            <a:schemeClr val="accent1"/>
+          </a:fillRef>
+          <a:effectRef idx="0">
+            <a:schemeClr val="accent1"/>
+          </a:effectRef>
+          <a:fontRef idx="minor">
+            <a:schemeClr val="lt1"/>
+          </a:fontRef>
+        </p:style>
+        <p:txBody>
+          <a:bodyPr rtlCol="0" anchor="ctr"/>
+          <a:lstStyle/>
+          <a:p>
+            <a:pPr algn="ctr"/>
+            <a:endParaRPr lang="de-DE"/>
+          </a:p>
+        </p:txBody>
+      </p:sp>
+      <p:cxnSp>
+        <p:nvCxnSpPr>
+          <p:cNvPr id="6" name="Straight Connector 5">
+            <a:extLst>
+              <a:ext uri="{FF2B5EF4-FFF2-40B4-BE49-F238E27FC236}">
+                <a16:creationId xmlns:a16="http://schemas.microsoft.com/office/drawing/2014/main" id="{22E53BA1-BB8D-9448-AF4D-EF84F27DCDF1}"/>
+              </a:ext>
+            </a:extLst>
+          </p:cNvPr>
+          <p:cNvCxnSpPr>
+            <a:cxnSpLocks/>
+            <a:stCxn id="2" idx="2"/>
+            <a:endCxn id="2" idx="6"/>
+          </p:cNvCxnSpPr>
+          <p:nvPr/>
+        </p:nvCxnSpPr>
+        <p:spPr>
+          <a:xfrm>
+            <a:off x="3931920" y="2627425"/>
+            <a:ext cx="3511296" cy="0"/>
+          </a:xfrm>
+          <a:prstGeom prst="line">
+            <a:avLst/>
+          </a:prstGeom>
+          <a:ln w="12700">
+            <a:solidFill>
+              <a:schemeClr val="accent1"/>
+            </a:solidFill>
+          </a:ln>
+        </p:spPr>
+        <p:style>
+          <a:lnRef idx="1">
+            <a:schemeClr val="accent1"/>
+          </a:lnRef>
+          <a:fillRef idx="0">
+            <a:schemeClr val="accent1"/>
+          </a:fillRef>
+          <a:effectRef idx="0">
+            <a:schemeClr val="accent1"/>
+          </a:effectRef>
+          <a:fontRef idx="minor">
+            <a:schemeClr val="tx1"/>
+          </a:fontRef>
+        </p:style>
+      </p:cxnSp>
+      <p:cxnSp>
+        <p:nvCxnSpPr>
+          <p:cNvPr id="7" name="Straight Connector 6">
+            <a:extLst>
+              <a:ext uri="{FF2B5EF4-FFF2-40B4-BE49-F238E27FC236}">
+                <a16:creationId xmlns:a16="http://schemas.microsoft.com/office/drawing/2014/main" id="{85973C3A-C8AC-1941-A797-ABC1CCE338D7}"/>
+              </a:ext>
+            </a:extLst>
+          </p:cNvPr>
+          <p:cNvCxnSpPr>
+            <a:cxnSpLocks/>
+            <a:stCxn id="2" idx="0"/>
+          </p:cNvCxnSpPr>
+          <p:nvPr/>
+        </p:nvCxnSpPr>
+        <p:spPr>
+          <a:xfrm>
+            <a:off x="5687568" y="871777"/>
+            <a:ext cx="0" cy="3829770"/>
+          </a:xfrm>
+          <a:prstGeom prst="line">
+            <a:avLst/>
+          </a:prstGeom>
+          <a:ln w="12700">
+            <a:solidFill>
+              <a:schemeClr val="accent1"/>
+            </a:solidFill>
+          </a:ln>
+        </p:spPr>
+        <p:style>
+          <a:lnRef idx="1">
+            <a:schemeClr val="accent1"/>
+          </a:lnRef>
+          <a:fillRef idx="0">
+            <a:schemeClr val="accent1"/>
+          </a:fillRef>
+          <a:effectRef idx="0">
+            <a:schemeClr val="accent1"/>
+          </a:effectRef>
+          <a:fontRef idx="minor">
+            <a:schemeClr val="tx1"/>
+          </a:fontRef>
+        </p:style>
+      </p:cxnSp>
+      <p:cxnSp>
+        <p:nvCxnSpPr>
+          <p:cNvPr id="14" name="Straight Connector 13">
+            <a:extLst>
+              <a:ext uri="{FF2B5EF4-FFF2-40B4-BE49-F238E27FC236}">
+                <a16:creationId xmlns:a16="http://schemas.microsoft.com/office/drawing/2014/main" id="{21E900BC-BBE6-F44C-9F30-720F3A4617BA}"/>
+              </a:ext>
+            </a:extLst>
+          </p:cNvPr>
+          <p:cNvCxnSpPr>
+            <a:cxnSpLocks/>
+          </p:cNvCxnSpPr>
+          <p:nvPr/>
+        </p:nvCxnSpPr>
+        <p:spPr>
+          <a:xfrm>
+            <a:off x="5687568" y="2627425"/>
+            <a:ext cx="1375915" cy="2074122"/>
+          </a:xfrm>
+          <a:prstGeom prst="line">
+            <a:avLst/>
+          </a:prstGeom>
+          <a:ln w="12700">
+            <a:solidFill>
+              <a:schemeClr val="tx1"/>
+            </a:solidFill>
+          </a:ln>
+        </p:spPr>
+        <p:style>
+          <a:lnRef idx="1">
+            <a:schemeClr val="accent1"/>
+          </a:lnRef>
+          <a:fillRef idx="0">
+            <a:schemeClr val="accent1"/>
+          </a:fillRef>
+          <a:effectRef idx="0">
+            <a:schemeClr val="accent1"/>
+          </a:effectRef>
+          <a:fontRef idx="minor">
+            <a:schemeClr val="tx1"/>
+          </a:fontRef>
+        </p:style>
+      </p:cxnSp>
+      <p:sp>
+        <p:nvSpPr>
+          <p:cNvPr id="21" name="Rectangular Callout 20">
+            <a:extLst>
+              <a:ext uri="{FF2B5EF4-FFF2-40B4-BE49-F238E27FC236}">
+                <a16:creationId xmlns:a16="http://schemas.microsoft.com/office/drawing/2014/main" id="{082526F6-30C5-4B40-8B77-5C977BB978BF}"/>
+              </a:ext>
+            </a:extLst>
+          </p:cNvPr>
+          <p:cNvSpPr/>
+          <p:nvPr/>
+        </p:nvSpPr>
+        <p:spPr>
+          <a:xfrm>
+            <a:off x="6254056" y="4880418"/>
+            <a:ext cx="457829" cy="396034"/>
+          </a:xfrm>
+          <a:prstGeom prst="wedgeRectCallout">
+            <a:avLst>
+              <a:gd name="adj1" fmla="val -90661"/>
+              <a:gd name="adj2" fmla="val -117763"/>
+            </a:avLst>
+          </a:prstGeom>
+          <a:noFill/>
+        </p:spPr>
+        <p:style>
+          <a:lnRef idx="2">
+            <a:schemeClr val="accent1">
+              <a:shade val="50000"/>
+            </a:schemeClr>
+          </a:lnRef>
+          <a:fillRef idx="1">
+            <a:schemeClr val="accent1"/>
+          </a:fillRef>
+          <a:effectRef idx="0">
+            <a:schemeClr val="accent1"/>
+          </a:effectRef>
+          <a:fontRef idx="minor">
+            <a:schemeClr val="lt1"/>
+          </a:fontRef>
+        </p:style>
+        <p:txBody>
+          <a:bodyPr rtlCol="0" anchor="ctr"/>
+          <a:lstStyle/>
+          <a:p>
+            <a:pPr algn="ctr"/>
+            <a:r>
+              <a:rPr lang="el-GR" dirty="0">
+                <a:solidFill>
+                  <a:sysClr val="windowText" lastClr="000000"/>
+                </a:solidFill>
+              </a:rPr>
+              <a:t>α</a:t>
+            </a:r>
+            <a:endParaRPr lang="de-DE" dirty="0">
+              <a:solidFill>
+                <a:sysClr val="windowText" lastClr="000000"/>
+              </a:solidFill>
+            </a:endParaRPr>
+          </a:p>
+        </p:txBody>
+      </p:sp>
+      <p:sp>
+        <p:nvSpPr>
+          <p:cNvPr id="22" name="Rectangle 21">
+            <a:extLst>
+              <a:ext uri="{FF2B5EF4-FFF2-40B4-BE49-F238E27FC236}">
+                <a16:creationId xmlns:a16="http://schemas.microsoft.com/office/drawing/2014/main" id="{4684BEB6-8234-9941-BFE5-27807138A674}"/>
+              </a:ext>
+            </a:extLst>
+          </p:cNvPr>
+          <p:cNvSpPr/>
+          <p:nvPr/>
+        </p:nvSpPr>
+        <p:spPr>
+          <a:xfrm>
+            <a:off x="5937944" y="2515911"/>
+            <a:ext cx="316112" cy="369332"/>
+          </a:xfrm>
+          <a:prstGeom prst="rect">
+            <a:avLst/>
+          </a:prstGeom>
+        </p:spPr>
+        <p:txBody>
+          <a:bodyPr wrap="none">
+            <a:spAutoFit/>
+          </a:bodyPr>
+          <a:lstStyle/>
+          <a:p>
+            <a:r>
+              <a:rPr lang="el-GR" dirty="0"/>
+              <a:t>α</a:t>
+            </a:r>
+            <a:endParaRPr lang="de-DE" dirty="0"/>
+          </a:p>
+        </p:txBody>
+      </p:sp>
+      <p:sp>
+        <p:nvSpPr>
+          <p:cNvPr id="25" name="Rectangular Callout 24">
+            <a:extLst>
+              <a:ext uri="{FF2B5EF4-FFF2-40B4-BE49-F238E27FC236}">
+                <a16:creationId xmlns:a16="http://schemas.microsoft.com/office/drawing/2014/main" id="{A9AE527B-E112-9844-9ABD-67FC09D1FC94}"/>
+              </a:ext>
+            </a:extLst>
+          </p:cNvPr>
+          <p:cNvSpPr/>
+          <p:nvPr/>
+        </p:nvSpPr>
+        <p:spPr>
+          <a:xfrm>
+            <a:off x="7863210" y="4090394"/>
+            <a:ext cx="1101681" cy="396034"/>
+          </a:xfrm>
+          <a:prstGeom prst="wedgeRectCallout">
+            <a:avLst>
+              <a:gd name="adj1" fmla="val -171287"/>
+              <a:gd name="adj2" fmla="val 46477"/>
+            </a:avLst>
+          </a:prstGeom>
+          <a:noFill/>
+        </p:spPr>
+        <p:style>
+          <a:lnRef idx="2">
+            <a:schemeClr val="accent1">
+              <a:shade val="50000"/>
+            </a:schemeClr>
+          </a:lnRef>
+          <a:fillRef idx="1">
+            <a:schemeClr val="accent1"/>
+          </a:fillRef>
+          <a:effectRef idx="0">
+            <a:schemeClr val="accent1"/>
+          </a:effectRef>
+          <a:fontRef idx="minor">
+            <a:schemeClr val="lt1"/>
+          </a:fontRef>
+        </p:style>
+        <p:txBody>
+          <a:bodyPr rtlCol="0" anchor="ctr"/>
+          <a:lstStyle/>
+          <a:p>
+            <a:pPr algn="ctr"/>
+            <a:r>
+              <a:rPr lang="en-GB" dirty="0">
+                <a:solidFill>
+                  <a:sysClr val="windowText" lastClr="000000"/>
+                </a:solidFill>
+              </a:rPr>
+              <a:t>45</a:t>
+            </a:r>
+            <a:r>
+              <a:rPr lang="de-DE" dirty="0">
+                <a:solidFill>
+                  <a:sysClr val="windowText" lastClr="000000"/>
+                </a:solidFill>
+              </a:rPr>
+              <a:t>°+ </a:t>
+            </a:r>
+            <a:r>
+              <a:rPr lang="el-GR" dirty="0">
+                <a:solidFill>
+                  <a:sysClr val="windowText" lastClr="000000"/>
+                </a:solidFill>
+              </a:rPr>
+              <a:t>α</a:t>
+            </a:r>
+            <a:endParaRPr lang="de-DE" dirty="0">
+              <a:solidFill>
+                <a:sysClr val="windowText" lastClr="000000"/>
+              </a:solidFill>
+            </a:endParaRPr>
+          </a:p>
+        </p:txBody>
+      </p:sp>
+      <p:sp>
+        <p:nvSpPr>
+          <p:cNvPr id="26" name="Rectangular Callout 25">
+            <a:extLst>
+              <a:ext uri="{FF2B5EF4-FFF2-40B4-BE49-F238E27FC236}">
+                <a16:creationId xmlns:a16="http://schemas.microsoft.com/office/drawing/2014/main" id="{8BD6F740-3B5A-9F45-88E7-9F3FA5EFD144}"/>
+              </a:ext>
+            </a:extLst>
+          </p:cNvPr>
+          <p:cNvSpPr/>
+          <p:nvPr/>
+        </p:nvSpPr>
+        <p:spPr>
+          <a:xfrm>
+            <a:off x="8233653" y="2700577"/>
+            <a:ext cx="1101681" cy="396034"/>
+          </a:xfrm>
+          <a:prstGeom prst="wedgeRectCallout">
+            <a:avLst>
+              <a:gd name="adj1" fmla="val -263700"/>
+              <a:gd name="adj2" fmla="val 79801"/>
+            </a:avLst>
+          </a:prstGeom>
+          <a:noFill/>
+        </p:spPr>
+        <p:style>
+          <a:lnRef idx="2">
+            <a:schemeClr val="accent1">
+              <a:shade val="50000"/>
+            </a:schemeClr>
+          </a:lnRef>
+          <a:fillRef idx="1">
+            <a:schemeClr val="accent1"/>
+          </a:fillRef>
+          <a:effectRef idx="0">
+            <a:schemeClr val="accent1"/>
+          </a:effectRef>
+          <a:fontRef idx="minor">
+            <a:schemeClr val="lt1"/>
+          </a:fontRef>
+        </p:style>
+        <p:txBody>
+          <a:bodyPr rtlCol="0" anchor="ctr"/>
+          <a:lstStyle/>
+          <a:p>
+            <a:pPr algn="ctr"/>
+            <a:r>
+              <a:rPr lang="en-GB" dirty="0">
+                <a:solidFill>
+                  <a:sysClr val="windowText" lastClr="000000"/>
+                </a:solidFill>
+              </a:rPr>
+              <a:t>45</a:t>
+            </a:r>
+            <a:r>
+              <a:rPr lang="de-DE" dirty="0">
+                <a:solidFill>
+                  <a:sysClr val="windowText" lastClr="000000"/>
+                </a:solidFill>
+              </a:rPr>
+              <a:t>°- </a:t>
+            </a:r>
+            <a:r>
+              <a:rPr lang="el-GR" dirty="0">
+                <a:solidFill>
+                  <a:sysClr val="windowText" lastClr="000000"/>
+                </a:solidFill>
+              </a:rPr>
+              <a:t>α</a:t>
+            </a:r>
+            <a:endParaRPr lang="de-DE" dirty="0">
+              <a:solidFill>
+                <a:sysClr val="windowText" lastClr="000000"/>
+              </a:solidFill>
+            </a:endParaRPr>
+          </a:p>
+        </p:txBody>
+      </p:sp>
+      <p:cxnSp>
+        <p:nvCxnSpPr>
+          <p:cNvPr id="27" name="Straight Connector 26">
+            <a:extLst>
+              <a:ext uri="{FF2B5EF4-FFF2-40B4-BE49-F238E27FC236}">
+                <a16:creationId xmlns:a16="http://schemas.microsoft.com/office/drawing/2014/main" id="{1237E50F-47F7-1C46-A0A5-55008041506E}"/>
+              </a:ext>
+            </a:extLst>
+          </p:cNvPr>
+          <p:cNvCxnSpPr>
+            <a:cxnSpLocks/>
+            <a:stCxn id="2" idx="4"/>
+          </p:cNvCxnSpPr>
+          <p:nvPr/>
+        </p:nvCxnSpPr>
+        <p:spPr>
+          <a:xfrm>
+            <a:off x="5687568" y="4383073"/>
+            <a:ext cx="0" cy="318474"/>
+          </a:xfrm>
+          <a:prstGeom prst="line">
+            <a:avLst/>
+          </a:prstGeom>
+          <a:ln w="38100">
+            <a:solidFill>
+              <a:srgbClr val="FF0000"/>
+            </a:solidFill>
+          </a:ln>
+        </p:spPr>
+        <p:style>
+          <a:lnRef idx="1">
+            <a:schemeClr val="accent1"/>
+          </a:lnRef>
+          <a:fillRef idx="0">
+            <a:schemeClr val="accent1"/>
+          </a:fillRef>
+          <a:effectRef idx="0">
+            <a:schemeClr val="accent1"/>
+          </a:effectRef>
+          <a:fontRef idx="minor">
+            <a:schemeClr val="tx1"/>
+          </a:fontRef>
+        </p:style>
+      </p:cxnSp>
+      <mc:AlternateContent xmlns:mc="http://schemas.openxmlformats.org/markup-compatibility/2006">
+        <mc:Choice xmlns:a14="http://schemas.microsoft.com/office/drawing/2010/main" Requires="a14">
+          <p:sp>
+            <p:nvSpPr>
+              <p:cNvPr id="31" name="TextBox 30">
+                <a:extLst>
+                  <a:ext uri="{FF2B5EF4-FFF2-40B4-BE49-F238E27FC236}">
+                    <a16:creationId xmlns:a16="http://schemas.microsoft.com/office/drawing/2014/main" id="{99C809CE-EDEB-3049-BFDD-ED5D4A258262}"/>
+                  </a:ext>
+                </a:extLst>
+              </p:cNvPr>
+              <p:cNvSpPr txBox="1"/>
+              <p:nvPr/>
+            </p:nvSpPr>
+            <p:spPr>
+              <a:xfrm>
+                <a:off x="1388301" y="5481290"/>
+                <a:ext cx="10044288" cy="556243"/>
+              </a:xfrm>
+              <a:prstGeom prst="rect">
+                <a:avLst/>
+              </a:prstGeom>
+              <a:noFill/>
+            </p:spPr>
+            <p:txBody>
+              <a:bodyPr wrap="none" rtlCol="0">
+                <a:spAutoFit/>
+              </a:bodyPr>
+              <a:lstStyle/>
+              <a:p>
+                <a:pPr/>
+                <a14:m>
+                  <m:oMath xmlns:m="http://schemas.openxmlformats.org/officeDocument/2006/math">
+                    <m:func>
+                      <m:funcPr>
+                        <m:ctrlPr>
+                          <a:rPr lang="en-GB" b="0" i="1" smtClean="0">
+                            <a:latin typeface="Cambria Math" panose="02040503050406030204" pitchFamily="18" charset="0"/>
+                          </a:rPr>
+                        </m:ctrlPr>
+                      </m:funcPr>
+                      <m:fName>
+                        <m:r>
+                          <m:rPr>
+                            <m:sty m:val="p"/>
+                          </m:rPr>
+                          <a:rPr lang="en-GB" b="0" i="0" smtClean="0">
+                            <a:latin typeface="Cambria Math" panose="02040503050406030204" pitchFamily="18" charset="0"/>
+                          </a:rPr>
+                          <m:t>cos</m:t>
+                        </m:r>
+                      </m:fName>
+                      <m:e>
+                        <m:d>
+                          <m:dPr>
+                            <m:ctrlPr>
+                              <a:rPr lang="en-GB" b="0" i="1" smtClean="0">
+                                <a:latin typeface="Cambria Math" panose="02040503050406030204" pitchFamily="18" charset="0"/>
+                              </a:rPr>
+                            </m:ctrlPr>
+                          </m:dPr>
+                          <m:e>
+                            <m:r>
+                              <m:rPr>
+                                <m:nor/>
+                              </m:rPr>
+                              <a:rPr lang="en-GB" dirty="0">
+                                <a:solidFill>
+                                  <a:sysClr val="windowText" lastClr="000000"/>
+                                </a:solidFill>
+                              </a:rPr>
+                              <m:t>45</m:t>
+                            </m:r>
+                            <m:r>
+                              <m:rPr>
+                                <m:nor/>
+                              </m:rPr>
+                              <a:rPr lang="de-DE" dirty="0">
+                                <a:solidFill>
+                                  <a:sysClr val="windowText" lastClr="000000"/>
+                                </a:solidFill>
+                              </a:rPr>
+                              <m:t>°</m:t>
+                            </m:r>
+                            <m:r>
+                              <m:rPr>
+                                <m:nor/>
+                              </m:rPr>
+                              <a:rPr lang="en-GB" b="0" i="0" dirty="0" smtClean="0">
+                                <a:solidFill>
+                                  <a:sysClr val="windowText" lastClr="000000"/>
+                                </a:solidFill>
+                              </a:rPr>
+                              <m:t>-</m:t>
+                            </m:r>
+                            <m:r>
+                              <m:rPr>
+                                <m:nor/>
+                              </m:rPr>
+                              <a:rPr lang="de-DE" dirty="0">
+                                <a:solidFill>
+                                  <a:sysClr val="windowText" lastClr="000000"/>
+                                </a:solidFill>
+                              </a:rPr>
+                              <m:t> </m:t>
+                            </m:r>
+                            <m:r>
+                              <m:rPr>
+                                <m:nor/>
+                              </m:rPr>
+                              <a:rPr lang="el-GR" dirty="0">
+                                <a:solidFill>
+                                  <a:sysClr val="windowText" lastClr="000000"/>
+                                </a:solidFill>
+                              </a:rPr>
+                              <m:t>α</m:t>
+                            </m:r>
+                            <m:r>
+                              <m:rPr>
+                                <m:nor/>
+                              </m:rPr>
+                              <a:rPr lang="de-DE" dirty="0">
+                                <a:solidFill>
+                                  <a:sysClr val="windowText" lastClr="000000"/>
+                                </a:solidFill>
+                              </a:rPr>
+                              <m:t> </m:t>
+                            </m:r>
+                          </m:e>
+                        </m:d>
+                      </m:e>
+                    </m:func>
+                    <m:r>
+                      <a:rPr lang="en-GB" b="0" i="1" smtClean="0">
+                        <a:latin typeface="Cambria Math" panose="02040503050406030204" pitchFamily="18" charset="0"/>
+                        <a:ea typeface="Cambria Math" panose="02040503050406030204" pitchFamily="18" charset="0"/>
+                      </a:rPr>
+                      <m:t>= </m:t>
+                    </m:r>
+                    <m:f>
+                      <m:fPr>
+                        <m:ctrlPr>
+                          <a:rPr lang="en-GB" b="0" i="1" smtClean="0">
+                            <a:latin typeface="Cambria Math" panose="02040503050406030204" pitchFamily="18" charset="0"/>
+                            <a:ea typeface="Cambria Math" panose="02040503050406030204" pitchFamily="18" charset="0"/>
+                          </a:rPr>
+                        </m:ctrlPr>
+                      </m:fPr>
+                      <m:num>
+                        <m:r>
+                          <a:rPr lang="en-GB" b="0" i="1" smtClean="0">
+                            <a:latin typeface="Cambria Math" panose="02040503050406030204" pitchFamily="18" charset="0"/>
+                            <a:ea typeface="Cambria Math" panose="02040503050406030204" pitchFamily="18" charset="0"/>
+                          </a:rPr>
+                          <m:t>𝑅</m:t>
+                        </m:r>
+                        <m:r>
+                          <a:rPr lang="en-GB" b="0" i="1" smtClean="0">
+                            <a:latin typeface="Cambria Math" panose="02040503050406030204" pitchFamily="18" charset="0"/>
+                            <a:ea typeface="Cambria Math" panose="02040503050406030204" pitchFamily="18" charset="0"/>
+                          </a:rPr>
+                          <m:t>+</m:t>
+                        </m:r>
+                        <m:r>
+                          <m:rPr>
+                            <m:nor/>
+                          </m:rPr>
+                          <a:rPr lang="en-GB" b="0" i="0" smtClean="0">
+                            <a:latin typeface="Cambria Math" panose="02040503050406030204" pitchFamily="18" charset="0"/>
+                            <a:ea typeface="Cambria Math" panose="02040503050406030204" pitchFamily="18" charset="0"/>
+                          </a:rPr>
+                          <m:t>offset</m:t>
+                        </m:r>
+                      </m:num>
+                      <m:den>
+                        <m:rad>
+                          <m:radPr>
+                            <m:degHide m:val="on"/>
+                            <m:ctrlPr>
+                              <a:rPr lang="en-GB" b="0" i="1" smtClean="0">
+                                <a:latin typeface="Cambria Math" panose="02040503050406030204" pitchFamily="18" charset="0"/>
+                                <a:ea typeface="Cambria Math" panose="02040503050406030204" pitchFamily="18" charset="0"/>
+                              </a:rPr>
+                            </m:ctrlPr>
+                          </m:radPr>
+                          <m:deg/>
+                          <m:e>
+                            <m:r>
+                              <a:rPr lang="en-GB" b="0" i="1" smtClean="0">
+                                <a:latin typeface="Cambria Math" panose="02040503050406030204" pitchFamily="18" charset="0"/>
+                                <a:ea typeface="Cambria Math" panose="02040503050406030204" pitchFamily="18" charset="0"/>
+                              </a:rPr>
+                              <m:t>2 </m:t>
+                            </m:r>
+                          </m:e>
+                        </m:rad>
+                        <m:r>
+                          <a:rPr lang="en-GB" b="0" i="1" smtClean="0">
+                            <a:latin typeface="Cambria Math" panose="02040503050406030204" pitchFamily="18" charset="0"/>
+                            <a:ea typeface="Cambria Math" panose="02040503050406030204" pitchFamily="18" charset="0"/>
+                          </a:rPr>
+                          <m:t>𝑅</m:t>
+                        </m:r>
+                      </m:den>
+                    </m:f>
+                    <m:r>
+                      <a:rPr lang="en-GB" b="0" i="1" smtClean="0">
+                        <a:latin typeface="Cambria Math" panose="02040503050406030204" pitchFamily="18" charset="0"/>
+                        <a:ea typeface="Cambria Math" panose="02040503050406030204" pitchFamily="18" charset="0"/>
+                      </a:rPr>
+                      <m:t>   </m:t>
+                    </m:r>
+                    <m:r>
+                      <a:rPr lang="en-GB" b="0" i="1" smtClean="0">
+                        <a:latin typeface="Cambria Math" panose="02040503050406030204" pitchFamily="18" charset="0"/>
+                        <a:ea typeface="Cambria Math" panose="02040503050406030204" pitchFamily="18" charset="0"/>
+                      </a:rPr>
+                      <m:t>  </m:t>
+                    </m:r>
+                    <m:r>
+                      <a:rPr lang="en-GB" b="0" i="1" smtClean="0">
+                        <a:latin typeface="Cambria Math" panose="02040503050406030204" pitchFamily="18" charset="0"/>
+                        <a:ea typeface="Cambria Math" panose="02040503050406030204" pitchFamily="18" charset="0"/>
+                      </a:rPr>
+                      <m:t>𝑜𝑟</m:t>
+                    </m:r>
+                    <m:r>
+                      <a:rPr lang="en-GB" b="0" i="1" smtClean="0">
+                        <a:latin typeface="Cambria Math" panose="02040503050406030204" pitchFamily="18" charset="0"/>
+                        <a:ea typeface="Cambria Math" panose="02040503050406030204" pitchFamily="18" charset="0"/>
+                      </a:rPr>
+                      <m:t>    </m:t>
+                    </m:r>
+                    <m:r>
+                      <m:rPr>
+                        <m:nor/>
+                      </m:rPr>
+                      <a:rPr lang="en-GB" b="0" i="0" smtClean="0">
+                        <a:latin typeface="Cambria Math" panose="02040503050406030204" pitchFamily="18" charset="0"/>
+                        <a:ea typeface="Cambria Math" panose="02040503050406030204" pitchFamily="18" charset="0"/>
+                      </a:rPr>
+                      <m:t>R</m:t>
+                    </m:r>
+                    <m:r>
+                      <m:rPr>
+                        <m:nor/>
+                      </m:rPr>
+                      <a:rPr lang="en-GB" b="0" i="0" smtClean="0">
+                        <a:latin typeface="Cambria Math" panose="02040503050406030204" pitchFamily="18" charset="0"/>
+                        <a:ea typeface="Cambria Math" panose="02040503050406030204" pitchFamily="18" charset="0"/>
+                      </a:rPr>
+                      <m:t>+</m:t>
+                    </m:r>
+                    <m:r>
+                      <a:rPr lang="en-GB" b="0" i="1" smtClean="0">
+                        <a:latin typeface="Cambria Math" panose="02040503050406030204" pitchFamily="18" charset="0"/>
+                        <a:ea typeface="Cambria Math" panose="02040503050406030204" pitchFamily="18" charset="0"/>
+                      </a:rPr>
+                      <m:t> </m:t>
+                    </m:r>
+                    <m:r>
+                      <m:rPr>
+                        <m:nor/>
+                      </m:rPr>
+                      <a:rPr lang="en-GB">
+                        <a:latin typeface="Cambria Math" panose="02040503050406030204" pitchFamily="18" charset="0"/>
+                        <a:ea typeface="Cambria Math" panose="02040503050406030204" pitchFamily="18" charset="0"/>
+                      </a:rPr>
+                      <m:t>offset</m:t>
+                    </m:r>
+                    <m:r>
+                      <a:rPr lang="en-GB" b="0" i="1" smtClean="0">
+                        <a:latin typeface="Cambria Math" panose="02040503050406030204" pitchFamily="18" charset="0"/>
+                        <a:ea typeface="Cambria Math" panose="02040503050406030204" pitchFamily="18" charset="0"/>
+                      </a:rPr>
+                      <m:t>=</m:t>
+                    </m:r>
+                    <m:rad>
+                      <m:radPr>
+                        <m:degHide m:val="on"/>
+                        <m:ctrlPr>
+                          <a:rPr lang="en-GB" i="1">
+                            <a:latin typeface="Cambria Math" panose="02040503050406030204" pitchFamily="18" charset="0"/>
+                            <a:ea typeface="Cambria Math" panose="02040503050406030204" pitchFamily="18" charset="0"/>
+                          </a:rPr>
+                        </m:ctrlPr>
+                      </m:radPr>
+                      <m:deg/>
+                      <m:e>
+                        <m:r>
+                          <a:rPr lang="en-GB" i="1">
+                            <a:latin typeface="Cambria Math" panose="02040503050406030204" pitchFamily="18" charset="0"/>
+                            <a:ea typeface="Cambria Math" panose="02040503050406030204" pitchFamily="18" charset="0"/>
+                          </a:rPr>
+                          <m:t>2 </m:t>
+                        </m:r>
+                      </m:e>
+                    </m:rad>
+                    <m:r>
+                      <a:rPr lang="en-GB" i="1">
+                        <a:latin typeface="Cambria Math" panose="02040503050406030204" pitchFamily="18" charset="0"/>
+                        <a:ea typeface="Cambria Math" panose="02040503050406030204" pitchFamily="18" charset="0"/>
+                      </a:rPr>
+                      <m:t>𝑅</m:t>
+                    </m:r>
+                  </m:oMath>
+                </a14:m>
+                <a:r>
+                  <a:rPr lang="en-US" dirty="0"/>
+                  <a:t> </a:t>
+                </a:r>
+                <a14:m>
+                  <m:oMath xmlns:m="http://schemas.openxmlformats.org/officeDocument/2006/math">
+                    <m:func>
+                      <m:funcPr>
+                        <m:ctrlPr>
+                          <a:rPr lang="en-GB" i="1">
+                            <a:latin typeface="Cambria Math" panose="02040503050406030204" pitchFamily="18" charset="0"/>
+                          </a:rPr>
+                        </m:ctrlPr>
+                      </m:funcPr>
+                      <m:fName>
+                        <m:r>
+                          <m:rPr>
+                            <m:sty m:val="p"/>
+                          </m:rPr>
+                          <a:rPr lang="en-GB">
+                            <a:latin typeface="Cambria Math" panose="02040503050406030204" pitchFamily="18" charset="0"/>
+                          </a:rPr>
+                          <m:t>cos</m:t>
+                        </m:r>
+                      </m:fName>
+                      <m:e>
+                        <m:d>
+                          <m:dPr>
+                            <m:ctrlPr>
+                              <a:rPr lang="en-GB" i="1">
+                                <a:latin typeface="Cambria Math" panose="02040503050406030204" pitchFamily="18" charset="0"/>
+                              </a:rPr>
+                            </m:ctrlPr>
+                          </m:dPr>
+                          <m:e>
+                            <m:r>
+                              <m:rPr>
+                                <m:nor/>
+                              </m:rPr>
+                              <a:rPr lang="en-GB" dirty="0">
+                                <a:solidFill>
+                                  <a:sysClr val="windowText" lastClr="000000"/>
+                                </a:solidFill>
+                              </a:rPr>
+                              <m:t>45</m:t>
+                            </m:r>
+                            <m:r>
+                              <m:rPr>
+                                <m:nor/>
+                              </m:rPr>
+                              <a:rPr lang="de-DE" dirty="0">
+                                <a:solidFill>
+                                  <a:sysClr val="windowText" lastClr="000000"/>
+                                </a:solidFill>
+                              </a:rPr>
+                              <m:t>°</m:t>
+                            </m:r>
+                            <m:r>
+                              <m:rPr>
+                                <m:nor/>
+                              </m:rPr>
+                              <a:rPr lang="en-GB" dirty="0">
+                                <a:solidFill>
+                                  <a:sysClr val="windowText" lastClr="000000"/>
+                                </a:solidFill>
+                              </a:rPr>
+                              <m:t>−</m:t>
+                            </m:r>
+                            <m:r>
+                              <m:rPr>
+                                <m:nor/>
+                              </m:rPr>
+                              <a:rPr lang="de-DE" dirty="0">
+                                <a:solidFill>
+                                  <a:sysClr val="windowText" lastClr="000000"/>
+                                </a:solidFill>
+                              </a:rPr>
+                              <m:t> </m:t>
+                            </m:r>
+                            <m:r>
+                              <m:rPr>
+                                <m:nor/>
+                              </m:rPr>
+                              <a:rPr lang="el-GR" dirty="0">
+                                <a:solidFill>
+                                  <a:sysClr val="windowText" lastClr="000000"/>
+                                </a:solidFill>
+                              </a:rPr>
+                              <m:t>α</m:t>
+                            </m:r>
+                          </m:e>
+                        </m:d>
+                        <m:r>
+                          <a:rPr lang="en-GB" b="0" i="1" dirty="0" smtClean="0">
+                            <a:solidFill>
+                              <a:sysClr val="windowText" lastClr="000000"/>
+                            </a:solidFill>
+                            <a:latin typeface="Cambria Math" panose="02040503050406030204" pitchFamily="18" charset="0"/>
+                          </a:rPr>
+                          <m:t>     </m:t>
+                        </m:r>
+                        <m:r>
+                          <a:rPr lang="en-GB" b="0" i="1" dirty="0" smtClean="0">
+                            <a:solidFill>
+                              <a:sysClr val="windowText" lastClr="000000"/>
+                            </a:solidFill>
+                            <a:latin typeface="Cambria Math" panose="02040503050406030204" pitchFamily="18" charset="0"/>
+                          </a:rPr>
+                          <m:t>𝑜𝑟</m:t>
+                        </m:r>
+                        <m:r>
+                          <a:rPr lang="en-GB" b="0" i="1" dirty="0" smtClean="0">
+                            <a:solidFill>
+                              <a:sysClr val="windowText" lastClr="000000"/>
+                            </a:solidFill>
+                            <a:latin typeface="Cambria Math" panose="02040503050406030204" pitchFamily="18" charset="0"/>
+                          </a:rPr>
+                          <m:t>    </m:t>
+                        </m:r>
+                        <m:r>
+                          <m:rPr>
+                            <m:nor/>
+                          </m:rPr>
+                          <a:rPr lang="en-GB">
+                            <a:latin typeface="Cambria Math" panose="02040503050406030204" pitchFamily="18" charset="0"/>
+                            <a:ea typeface="Cambria Math" panose="02040503050406030204" pitchFamily="18" charset="0"/>
+                          </a:rPr>
+                          <m:t>offset</m:t>
+                        </m:r>
+                        <m:r>
+                          <a:rPr lang="en-GB" i="1">
+                            <a:latin typeface="Cambria Math" panose="02040503050406030204" pitchFamily="18" charset="0"/>
+                            <a:ea typeface="Cambria Math" panose="02040503050406030204" pitchFamily="18" charset="0"/>
+                          </a:rPr>
+                          <m:t>=</m:t>
+                        </m:r>
+                        <m:d>
+                          <m:dPr>
+                            <m:ctrlPr>
+                              <a:rPr lang="en-GB" b="0" i="1" smtClean="0">
+                                <a:latin typeface="Cambria Math" panose="02040503050406030204" pitchFamily="18" charset="0"/>
+                                <a:ea typeface="Cambria Math" panose="02040503050406030204" pitchFamily="18" charset="0"/>
+                              </a:rPr>
+                            </m:ctrlPr>
+                          </m:dPr>
+                          <m:e>
+                            <m:rad>
+                              <m:radPr>
+                                <m:degHide m:val="on"/>
+                                <m:ctrlPr>
+                                  <a:rPr lang="en-GB" i="1" smtClean="0">
+                                    <a:latin typeface="Cambria Math" panose="02040503050406030204" pitchFamily="18" charset="0"/>
+                                    <a:ea typeface="Cambria Math" panose="02040503050406030204" pitchFamily="18" charset="0"/>
+                                  </a:rPr>
+                                </m:ctrlPr>
+                              </m:radPr>
+                              <m:deg/>
+                              <m:e>
+                                <m:r>
+                                  <a:rPr lang="en-GB" i="1">
+                                    <a:latin typeface="Cambria Math" panose="02040503050406030204" pitchFamily="18" charset="0"/>
+                                    <a:ea typeface="Cambria Math" panose="02040503050406030204" pitchFamily="18" charset="0"/>
+                                  </a:rPr>
+                                  <m:t>2 </m:t>
+                                </m:r>
+                              </m:e>
+                            </m:rad>
+                            <m:func>
+                              <m:funcPr>
+                                <m:ctrlPr>
+                                  <a:rPr lang="en-GB" i="1">
+                                    <a:latin typeface="Cambria Math" panose="02040503050406030204" pitchFamily="18" charset="0"/>
+                                  </a:rPr>
+                                </m:ctrlPr>
+                              </m:funcPr>
+                              <m:fName>
+                                <m:r>
+                                  <m:rPr>
+                                    <m:sty m:val="p"/>
+                                  </m:rPr>
+                                  <a:rPr lang="en-GB">
+                                    <a:latin typeface="Cambria Math" panose="02040503050406030204" pitchFamily="18" charset="0"/>
+                                  </a:rPr>
+                                  <m:t>cos</m:t>
+                                </m:r>
+                              </m:fName>
+                              <m:e>
+                                <m:d>
+                                  <m:dPr>
+                                    <m:ctrlPr>
+                                      <a:rPr lang="en-GB" i="1">
+                                        <a:latin typeface="Cambria Math" panose="02040503050406030204" pitchFamily="18" charset="0"/>
+                                      </a:rPr>
+                                    </m:ctrlPr>
+                                  </m:dPr>
+                                  <m:e>
+                                    <m:r>
+                                      <m:rPr>
+                                        <m:nor/>
+                                      </m:rPr>
+                                      <a:rPr lang="en-GB" dirty="0">
+                                        <a:solidFill>
+                                          <a:sysClr val="windowText" lastClr="000000"/>
+                                        </a:solidFill>
+                                      </a:rPr>
+                                      <m:t>45</m:t>
+                                    </m:r>
+                                    <m:r>
+                                      <m:rPr>
+                                        <m:nor/>
+                                      </m:rPr>
+                                      <a:rPr lang="de-DE" dirty="0">
+                                        <a:solidFill>
+                                          <a:sysClr val="windowText" lastClr="000000"/>
+                                        </a:solidFill>
+                                      </a:rPr>
+                                      <m:t>°</m:t>
+                                    </m:r>
+                                    <m:r>
+                                      <m:rPr>
+                                        <m:nor/>
+                                      </m:rPr>
+                                      <a:rPr lang="en-GB" dirty="0">
+                                        <a:solidFill>
+                                          <a:sysClr val="windowText" lastClr="000000"/>
+                                        </a:solidFill>
+                                      </a:rPr>
+                                      <m:t>−</m:t>
+                                    </m:r>
+                                    <m:r>
+                                      <m:rPr>
+                                        <m:nor/>
+                                      </m:rPr>
+                                      <a:rPr lang="de-DE" dirty="0">
+                                        <a:solidFill>
+                                          <a:sysClr val="windowText" lastClr="000000"/>
+                                        </a:solidFill>
+                                      </a:rPr>
+                                      <m:t> </m:t>
+                                    </m:r>
+                                    <m:r>
+                                      <m:rPr>
+                                        <m:nor/>
+                                      </m:rPr>
+                                      <a:rPr lang="el-GR" dirty="0">
+                                        <a:solidFill>
+                                          <a:sysClr val="windowText" lastClr="000000"/>
+                                        </a:solidFill>
+                                      </a:rPr>
+                                      <m:t>α</m:t>
+                                    </m:r>
+                                  </m:e>
+                                </m:d>
+                              </m:e>
+                            </m:func>
+                            <m:r>
+                              <a:rPr lang="en-GB" b="0" i="1" dirty="0" smtClean="0">
+                                <a:solidFill>
+                                  <a:sysClr val="windowText" lastClr="000000"/>
+                                </a:solidFill>
+                                <a:latin typeface="Cambria Math" panose="02040503050406030204" pitchFamily="18" charset="0"/>
+                              </a:rPr>
+                              <m:t> −1</m:t>
+                            </m:r>
+                          </m:e>
+                        </m:d>
+                        <m:r>
+                          <a:rPr lang="en-GB" b="0" i="1" smtClean="0">
+                            <a:latin typeface="Cambria Math" panose="02040503050406030204" pitchFamily="18" charset="0"/>
+                            <a:ea typeface="Cambria Math" panose="02040503050406030204" pitchFamily="18" charset="0"/>
+                          </a:rPr>
+                          <m:t> </m:t>
+                        </m:r>
+                        <m:r>
+                          <a:rPr lang="en-GB" i="1">
+                            <a:latin typeface="Cambria Math" panose="02040503050406030204" pitchFamily="18" charset="0"/>
+                            <a:ea typeface="Cambria Math" panose="02040503050406030204" pitchFamily="18" charset="0"/>
+                          </a:rPr>
+                          <m:t>𝑅</m:t>
+                        </m:r>
+                        <m:r>
+                          <m:rPr>
+                            <m:nor/>
+                          </m:rPr>
+                          <a:rPr lang="en-US" dirty="0"/>
+                          <m:t> </m:t>
+                        </m:r>
+                      </m:e>
+                    </m:func>
+                  </m:oMath>
+                </a14:m>
+                <a:endParaRPr lang="en-US" dirty="0"/>
+              </a:p>
+            </p:txBody>
+          </p:sp>
+        </mc:Choice>
+        <mc:Fallback>
+          <p:sp>
+            <p:nvSpPr>
+              <p:cNvPr id="31" name="TextBox 30">
+                <a:extLst>
+                  <a:ext uri="{FF2B5EF4-FFF2-40B4-BE49-F238E27FC236}">
+                    <a16:creationId xmlns:a16="http://schemas.microsoft.com/office/drawing/2014/main" id="{99C809CE-EDEB-3049-BFDD-ED5D4A258262}"/>
+                  </a:ext>
+                </a:extLst>
+              </p:cNvPr>
+              <p:cNvSpPr txBox="1">
+                <a:spLocks noRot="1" noChangeAspect="1" noMove="1" noResize="1" noEditPoints="1" noAdjustHandles="1" noChangeArrowheads="1" noChangeShapeType="1" noTextEdit="1"/>
+              </p:cNvSpPr>
+              <p:nvPr/>
+            </p:nvSpPr>
+            <p:spPr>
+              <a:xfrm>
+                <a:off x="1388301" y="5481290"/>
+                <a:ext cx="10044288" cy="556243"/>
+              </a:xfrm>
+              <a:prstGeom prst="rect">
+                <a:avLst/>
+              </a:prstGeom>
+              <a:blipFill>
+                <a:blip r:embed="rId2"/>
+                <a:stretch>
+                  <a:fillRect b="-11628"/>
+                </a:stretch>
+              </a:blipFill>
+            </p:spPr>
+            <p:txBody>
+              <a:bodyPr/>
+              <a:lstStyle/>
+              <a:p>
+                <a:r>
+                  <a:rPr lang="de-DE">
+                    <a:noFill/>
+                  </a:rPr>
+                  <a:t> </a:t>
+                </a:r>
+              </a:p>
+            </p:txBody>
+          </p:sp>
+        </mc:Fallback>
+      </mc:AlternateContent>
+      <p:sp>
+        <p:nvSpPr>
+          <p:cNvPr id="32" name="Rectangular Callout 31">
+            <a:extLst>
+              <a:ext uri="{FF2B5EF4-FFF2-40B4-BE49-F238E27FC236}">
+                <a16:creationId xmlns:a16="http://schemas.microsoft.com/office/drawing/2014/main" id="{BCAAF2CD-500C-1B48-B97E-CD7AEC7ACCFE}"/>
+              </a:ext>
+            </a:extLst>
+          </p:cNvPr>
+          <p:cNvSpPr/>
+          <p:nvPr/>
+        </p:nvSpPr>
+        <p:spPr>
+          <a:xfrm>
+            <a:off x="3931920" y="4795347"/>
+            <a:ext cx="1101681" cy="396034"/>
+          </a:xfrm>
+          <a:prstGeom prst="wedgeRectCallout">
+            <a:avLst>
+              <a:gd name="adj1" fmla="val 104443"/>
+              <a:gd name="adj2" fmla="val -113971"/>
+            </a:avLst>
+          </a:prstGeom>
+          <a:noFill/>
+          <a:ln>
+            <a:solidFill>
+              <a:srgbClr val="FF0000"/>
+            </a:solidFill>
+          </a:ln>
+        </p:spPr>
+        <p:style>
+          <a:lnRef idx="2">
+            <a:schemeClr val="accent1">
+              <a:shade val="50000"/>
+            </a:schemeClr>
+          </a:lnRef>
+          <a:fillRef idx="1">
+            <a:schemeClr val="accent1"/>
+          </a:fillRef>
+          <a:effectRef idx="0">
+            <a:schemeClr val="accent1"/>
+          </a:effectRef>
+          <a:fontRef idx="minor">
+            <a:schemeClr val="lt1"/>
+          </a:fontRef>
+        </p:style>
+        <p:txBody>
+          <a:bodyPr rtlCol="0" anchor="ctr"/>
+          <a:lstStyle/>
+          <a:p>
+            <a:pPr algn="ctr"/>
+            <a:r>
+              <a:rPr lang="en-GB" dirty="0">
+                <a:solidFill>
+                  <a:srgbClr val="FF0000"/>
+                </a:solidFill>
+              </a:rPr>
+              <a:t>offset</a:t>
+            </a:r>
+            <a:endParaRPr lang="de-DE" dirty="0">
+              <a:solidFill>
+                <a:srgbClr val="FF0000"/>
+              </a:solidFill>
+            </a:endParaRPr>
+          </a:p>
+        </p:txBody>
+      </p:sp>
+      <p:cxnSp>
+        <p:nvCxnSpPr>
+          <p:cNvPr id="33" name="Straight Connector 32">
+            <a:extLst>
+              <a:ext uri="{FF2B5EF4-FFF2-40B4-BE49-F238E27FC236}">
+                <a16:creationId xmlns:a16="http://schemas.microsoft.com/office/drawing/2014/main" id="{F973B32F-AEEF-B442-A514-206DD791E63D}"/>
+              </a:ext>
+            </a:extLst>
+          </p:cNvPr>
+          <p:cNvCxnSpPr>
+            <a:cxnSpLocks/>
+          </p:cNvCxnSpPr>
+          <p:nvPr/>
+        </p:nvCxnSpPr>
+        <p:spPr>
+          <a:xfrm>
+            <a:off x="2231136" y="-152254"/>
+            <a:ext cx="4832347" cy="4853801"/>
+          </a:xfrm>
+          <a:prstGeom prst="line">
+            <a:avLst/>
+          </a:prstGeom>
+          <a:ln w="12700">
+            <a:solidFill>
+              <a:schemeClr val="tx1"/>
+            </a:solidFill>
+          </a:ln>
+        </p:spPr>
+        <p:style>
+          <a:lnRef idx="1">
+            <a:schemeClr val="accent1"/>
+          </a:lnRef>
+          <a:fillRef idx="0">
+            <a:schemeClr val="accent1"/>
+          </a:fillRef>
+          <a:effectRef idx="0">
+            <a:schemeClr val="accent1"/>
+          </a:effectRef>
+          <a:fontRef idx="minor">
+            <a:schemeClr val="tx1"/>
+          </a:fontRef>
+        </p:style>
+      </p:cxnSp>
+    </p:spTree>
+    <p:extLst>
+      <p:ext uri="{BB962C8B-B14F-4D97-AF65-F5344CB8AC3E}">
+        <p14:creationId xmlns:p14="http://schemas.microsoft.com/office/powerpoint/2010/main" val="2315392084"/>
+      </p:ext>
+    </p:extLst>
+  </p:cSld>
+  <p:clrMapOvr>
+    <a:masterClrMapping/>
+  </p:clrMapOvr>
+</p:sld>
+</file>
+
+<file path=ppt/slides/slide3.xml><?xml version="1.0" encoding="utf-8"?>
+<p:sld xmlns:a="http://schemas.openxmlformats.org/drawingml/2006/main" xmlns:r="http://schemas.openxmlformats.org/officeDocument/2006/relationships" xmlns:p="http://schemas.openxmlformats.org/presentationml/2006/main">
+  <p:cSld>
+    <p:spTree>
+      <p:nvGrpSpPr>
+        <p:cNvPr id="1" name=""/>
+        <p:cNvGrpSpPr/>
+        <p:nvPr/>
+      </p:nvGrpSpPr>
+      <p:grpSpPr>
+        <a:xfrm>
+          <a:off x="0" y="0"/>
+          <a:ext cx="0" cy="0"/>
+          <a:chOff x="0" y="0"/>
+          <a:chExt cx="0" cy="0"/>
+        </a:xfrm>
+      </p:grpSpPr>
+      <p:cxnSp>
+        <p:nvCxnSpPr>
+          <p:cNvPr id="4" name="Straight Connector 3">
+            <a:extLst>
+              <a:ext uri="{FF2B5EF4-FFF2-40B4-BE49-F238E27FC236}">
+                <a16:creationId xmlns:a16="http://schemas.microsoft.com/office/drawing/2014/main" id="{ACAA66F4-C28B-8647-9BBE-B89596E5A80C}"/>
+              </a:ext>
+            </a:extLst>
+          </p:cNvPr>
+          <p:cNvCxnSpPr>
+            <a:cxnSpLocks/>
+          </p:cNvCxnSpPr>
+          <p:nvPr/>
+        </p:nvCxnSpPr>
+        <p:spPr>
+          <a:xfrm>
+            <a:off x="2231136" y="4701567"/>
+            <a:ext cx="8311896" cy="0"/>
+          </a:xfrm>
+          <a:prstGeom prst="line">
+            <a:avLst/>
+          </a:prstGeom>
+          <a:ln w="12700">
+            <a:solidFill>
+              <a:schemeClr val="tx1"/>
+            </a:solidFill>
+          </a:ln>
+        </p:spPr>
+        <p:style>
+          <a:lnRef idx="1">
+            <a:schemeClr val="accent1"/>
+          </a:lnRef>
+          <a:fillRef idx="0">
+            <a:schemeClr val="accent1"/>
+          </a:fillRef>
+          <a:effectRef idx="0">
+            <a:schemeClr val="accent1"/>
+          </a:effectRef>
+          <a:fontRef idx="minor">
+            <a:schemeClr val="tx1"/>
+          </a:fontRef>
+        </p:style>
+      </p:cxnSp>
+      <p:grpSp>
+        <p:nvGrpSpPr>
+          <p:cNvPr id="8" name="Group 7">
+            <a:extLst>
+              <a:ext uri="{FF2B5EF4-FFF2-40B4-BE49-F238E27FC236}">
+                <a16:creationId xmlns:a16="http://schemas.microsoft.com/office/drawing/2014/main" id="{E1ABEA62-DC2D-8546-B79A-6B3D6359173D}"/>
+              </a:ext>
+            </a:extLst>
+          </p:cNvPr>
+          <p:cNvGrpSpPr/>
+          <p:nvPr/>
+        </p:nvGrpSpPr>
+        <p:grpSpPr>
+          <a:xfrm rot="2882966">
+            <a:off x="2921539" y="-187949"/>
+            <a:ext cx="4560400" cy="4212604"/>
+            <a:chOff x="2921539" y="488943"/>
+            <a:chExt cx="4560400" cy="4212604"/>
+          </a:xfrm>
+        </p:grpSpPr>
+        <p:sp>
+          <p:nvSpPr>
+            <p:cNvPr id="2" name="Oval 1">
+              <a:extLst>
+                <a:ext uri="{FF2B5EF4-FFF2-40B4-BE49-F238E27FC236}">
+                  <a16:creationId xmlns:a16="http://schemas.microsoft.com/office/drawing/2014/main" id="{74E0C557-0DEF-4F4A-9CD1-02BC0B4C6643}"/>
+                </a:ext>
+              </a:extLst>
+            </p:cNvPr>
+            <p:cNvSpPr/>
+            <p:nvPr/>
+          </p:nvSpPr>
+          <p:spPr>
+            <a:xfrm>
+              <a:off x="3931920" y="871777"/>
+              <a:ext cx="3511296" cy="3511296"/>
+            </a:xfrm>
+            <a:prstGeom prst="ellipse">
+              <a:avLst/>
+            </a:prstGeom>
+            <a:noFill/>
+            <a:ln>
+              <a:solidFill>
+                <a:schemeClr val="accent1"/>
+              </a:solidFill>
+            </a:ln>
+          </p:spPr>
+          <p:style>
+            <a:lnRef idx="2">
+              <a:schemeClr val="accent1">
+                <a:shade val="50000"/>
+              </a:schemeClr>
+            </a:lnRef>
+            <a:fillRef idx="1">
+              <a:schemeClr val="accent1"/>
+            </a:fillRef>
+            <a:effectRef idx="0">
+              <a:schemeClr val="accent1"/>
+            </a:effectRef>
+            <a:fontRef idx="minor">
+              <a:schemeClr val="lt1"/>
+            </a:fontRef>
+          </p:style>
+          <p:txBody>
+            <a:bodyPr rtlCol="0" anchor="ctr"/>
+            <a:lstStyle/>
+            <a:p>
+              <a:pPr algn="ctr"/>
+              <a:endParaRPr lang="de-DE"/>
+            </a:p>
+          </p:txBody>
+        </p:sp>
+        <p:sp>
+          <p:nvSpPr>
+            <p:cNvPr id="5" name="Rectangle 4">
+              <a:extLst>
+                <a:ext uri="{FF2B5EF4-FFF2-40B4-BE49-F238E27FC236}">
+                  <a16:creationId xmlns:a16="http://schemas.microsoft.com/office/drawing/2014/main" id="{CBD186FE-6D75-5B48-A9C8-B105FC7FCE4A}"/>
+                </a:ext>
+              </a:extLst>
+            </p:cNvPr>
+            <p:cNvSpPr/>
+            <p:nvPr/>
+          </p:nvSpPr>
+          <p:spPr>
+            <a:xfrm rot="685106">
+              <a:off x="2921539" y="488943"/>
+              <a:ext cx="4560400" cy="3798780"/>
+            </a:xfrm>
+            <a:prstGeom prst="rect">
+              <a:avLst/>
+            </a:prstGeom>
+            <a:noFill/>
+            <a:ln>
+              <a:solidFill>
+                <a:schemeClr val="tx1"/>
+              </a:solidFill>
+            </a:ln>
+          </p:spPr>
+          <p:style>
+            <a:lnRef idx="2">
+              <a:schemeClr val="accent1">
+                <a:shade val="50000"/>
+              </a:schemeClr>
+            </a:lnRef>
+            <a:fillRef idx="1">
+              <a:schemeClr val="accent1"/>
+            </a:fillRef>
+            <a:effectRef idx="0">
+              <a:schemeClr val="accent1"/>
+            </a:effectRef>
+            <a:fontRef idx="minor">
+              <a:schemeClr val="lt1"/>
+            </a:fontRef>
+          </p:style>
+          <p:txBody>
+            <a:bodyPr rtlCol="0" anchor="ctr"/>
+            <a:lstStyle/>
+            <a:p>
+              <a:pPr algn="ctr"/>
+              <a:endParaRPr lang="de-DE"/>
+            </a:p>
+          </p:txBody>
+        </p:sp>
+        <p:cxnSp>
+          <p:nvCxnSpPr>
+            <p:cNvPr id="14" name="Straight Connector 13">
+              <a:extLst>
+                <a:ext uri="{FF2B5EF4-FFF2-40B4-BE49-F238E27FC236}">
+                  <a16:creationId xmlns:a16="http://schemas.microsoft.com/office/drawing/2014/main" id="{21E900BC-BBE6-F44C-9F30-720F3A4617BA}"/>
+                </a:ext>
+              </a:extLst>
+            </p:cNvPr>
+            <p:cNvCxnSpPr>
+              <a:cxnSpLocks/>
+            </p:cNvCxnSpPr>
+            <p:nvPr/>
+          </p:nvCxnSpPr>
+          <p:spPr>
+            <a:xfrm>
+              <a:off x="5687568" y="2627425"/>
+              <a:ext cx="1375915" cy="2074122"/>
+            </a:xfrm>
+            <a:prstGeom prst="line">
+              <a:avLst/>
+            </a:prstGeom>
+            <a:ln w="12700">
+              <a:solidFill>
+                <a:schemeClr val="tx1"/>
+              </a:solidFill>
+            </a:ln>
+          </p:spPr>
+          <p:style>
+            <a:lnRef idx="1">
+              <a:schemeClr val="accent1"/>
+            </a:lnRef>
+            <a:fillRef idx="0">
+              <a:schemeClr val="accent1"/>
+            </a:fillRef>
+            <a:effectRef idx="0">
+              <a:schemeClr val="accent1"/>
+            </a:effectRef>
+            <a:fontRef idx="minor">
+              <a:schemeClr val="tx1"/>
+            </a:fontRef>
+          </p:style>
+        </p:cxnSp>
+        <p:sp>
+          <p:nvSpPr>
+            <p:cNvPr id="22" name="Rectangle 21">
+              <a:extLst>
+                <a:ext uri="{FF2B5EF4-FFF2-40B4-BE49-F238E27FC236}">
+                  <a16:creationId xmlns:a16="http://schemas.microsoft.com/office/drawing/2014/main" id="{4684BEB6-8234-9941-BFE5-27807138A674}"/>
+                </a:ext>
+              </a:extLst>
+            </p:cNvPr>
+            <p:cNvSpPr/>
+            <p:nvPr/>
+          </p:nvSpPr>
+          <p:spPr>
+            <a:xfrm>
+              <a:off x="5937944" y="2515911"/>
+              <a:ext cx="316112" cy="369332"/>
+            </a:xfrm>
+            <a:prstGeom prst="rect">
+              <a:avLst/>
+            </a:prstGeom>
+          </p:spPr>
+          <p:txBody>
+            <a:bodyPr wrap="none">
+              <a:spAutoFit/>
+            </a:bodyPr>
+            <a:lstStyle/>
+            <a:p>
+              <a:r>
+                <a:rPr lang="el-GR" dirty="0"/>
+                <a:t>α</a:t>
+              </a:r>
+              <a:endParaRPr lang="de-DE" dirty="0"/>
+            </a:p>
+          </p:txBody>
+        </p:sp>
+      </p:grpSp>
+      <mc:AlternateContent xmlns:mc="http://schemas.openxmlformats.org/markup-compatibility/2006">
+        <mc:Choice xmlns:a14="http://schemas.microsoft.com/office/drawing/2010/main" Requires="a14">
+          <p:sp>
+            <p:nvSpPr>
+              <p:cNvPr id="31" name="TextBox 30">
+                <a:extLst>
+                  <a:ext uri="{FF2B5EF4-FFF2-40B4-BE49-F238E27FC236}">
+                    <a16:creationId xmlns:a16="http://schemas.microsoft.com/office/drawing/2014/main" id="{99C809CE-EDEB-3049-BFDD-ED5D4A258262}"/>
+                  </a:ext>
+                </a:extLst>
+              </p:cNvPr>
+              <p:cNvSpPr txBox="1"/>
+              <p:nvPr/>
+            </p:nvSpPr>
+            <p:spPr>
+              <a:xfrm>
+                <a:off x="1388301" y="5481290"/>
+                <a:ext cx="10150086" cy="556243"/>
+              </a:xfrm>
+              <a:prstGeom prst="rect">
+                <a:avLst/>
+              </a:prstGeom>
+              <a:noFill/>
+            </p:spPr>
+            <p:txBody>
+              <a:bodyPr wrap="none" rtlCol="0">
+                <a:spAutoFit/>
+              </a:bodyPr>
+              <a:lstStyle/>
+              <a:p>
+                <a:pPr/>
+                <a14:m>
+                  <m:oMath xmlns:m="http://schemas.openxmlformats.org/officeDocument/2006/math">
+                    <m:func>
+                      <m:funcPr>
+                        <m:ctrlPr>
+                          <a:rPr lang="en-GB" b="0" i="1" smtClean="0">
+                            <a:latin typeface="Cambria Math" panose="02040503050406030204" pitchFamily="18" charset="0"/>
+                          </a:rPr>
+                        </m:ctrlPr>
+                      </m:funcPr>
+                      <m:fName>
+                        <m:r>
+                          <m:rPr>
+                            <m:sty m:val="p"/>
+                          </m:rPr>
+                          <a:rPr lang="en-GB" b="0" i="0" smtClean="0">
+                            <a:latin typeface="Cambria Math" panose="02040503050406030204" pitchFamily="18" charset="0"/>
+                          </a:rPr>
+                          <m:t>cos</m:t>
+                        </m:r>
+                      </m:fName>
+                      <m:e>
+                        <m:d>
+                          <m:dPr>
+                            <m:ctrlPr>
+                              <a:rPr lang="en-GB" b="0" i="1" smtClean="0">
+                                <a:latin typeface="Cambria Math" panose="02040503050406030204" pitchFamily="18" charset="0"/>
+                              </a:rPr>
+                            </m:ctrlPr>
+                          </m:dPr>
+                          <m:e>
+                            <m:r>
+                              <m:rPr>
+                                <m:nor/>
+                              </m:rPr>
+                              <a:rPr lang="el-GR" dirty="0">
+                                <a:solidFill>
+                                  <a:sysClr val="windowText" lastClr="000000"/>
+                                </a:solidFill>
+                              </a:rPr>
+                              <m:t>α</m:t>
+                            </m:r>
+                            <m:r>
+                              <m:rPr>
+                                <m:nor/>
+                              </m:rPr>
+                              <a:rPr lang="en-GB" b="0" i="0" dirty="0" smtClean="0">
+                                <a:solidFill>
+                                  <a:sysClr val="windowText" lastClr="000000"/>
+                                </a:solidFill>
+                              </a:rPr>
+                              <m:t> - </m:t>
+                            </m:r>
+                            <m:r>
+                              <m:rPr>
+                                <m:nor/>
+                              </m:rPr>
+                              <a:rPr lang="en-GB" dirty="0">
+                                <a:solidFill>
+                                  <a:sysClr val="windowText" lastClr="000000"/>
+                                </a:solidFill>
+                              </a:rPr>
+                              <m:t>45</m:t>
+                            </m:r>
+                            <m:r>
+                              <m:rPr>
+                                <m:nor/>
+                              </m:rPr>
+                              <a:rPr lang="de-DE" dirty="0">
+                                <a:solidFill>
+                                  <a:sysClr val="windowText" lastClr="000000"/>
+                                </a:solidFill>
+                              </a:rPr>
+                              <m:t>°</m:t>
+                            </m:r>
+                          </m:e>
+                        </m:d>
+                      </m:e>
+                    </m:func>
+                    <m:r>
+                      <a:rPr lang="en-GB" b="0" i="1" smtClean="0">
+                        <a:latin typeface="Cambria Math" panose="02040503050406030204" pitchFamily="18" charset="0"/>
+                        <a:ea typeface="Cambria Math" panose="02040503050406030204" pitchFamily="18" charset="0"/>
+                      </a:rPr>
+                      <m:t>= </m:t>
+                    </m:r>
+                    <m:f>
+                      <m:fPr>
+                        <m:ctrlPr>
+                          <a:rPr lang="en-GB" b="0" i="1" smtClean="0">
+                            <a:latin typeface="Cambria Math" panose="02040503050406030204" pitchFamily="18" charset="0"/>
+                            <a:ea typeface="Cambria Math" panose="02040503050406030204" pitchFamily="18" charset="0"/>
+                          </a:rPr>
+                        </m:ctrlPr>
+                      </m:fPr>
+                      <m:num>
+                        <m:r>
+                          <a:rPr lang="en-GB" b="0" i="1" smtClean="0">
+                            <a:latin typeface="Cambria Math" panose="02040503050406030204" pitchFamily="18" charset="0"/>
+                            <a:ea typeface="Cambria Math" panose="02040503050406030204" pitchFamily="18" charset="0"/>
+                          </a:rPr>
+                          <m:t>𝑅</m:t>
+                        </m:r>
+                        <m:r>
+                          <a:rPr lang="en-GB" b="0" i="1" smtClean="0">
+                            <a:latin typeface="Cambria Math" panose="02040503050406030204" pitchFamily="18" charset="0"/>
+                            <a:ea typeface="Cambria Math" panose="02040503050406030204" pitchFamily="18" charset="0"/>
+                          </a:rPr>
+                          <m:t>+</m:t>
+                        </m:r>
+                        <m:r>
+                          <m:rPr>
+                            <m:nor/>
+                          </m:rPr>
+                          <a:rPr lang="en-GB" b="0" i="0" smtClean="0">
+                            <a:latin typeface="Cambria Math" panose="02040503050406030204" pitchFamily="18" charset="0"/>
+                            <a:ea typeface="Cambria Math" panose="02040503050406030204" pitchFamily="18" charset="0"/>
+                          </a:rPr>
+                          <m:t>offset</m:t>
+                        </m:r>
+                      </m:num>
+                      <m:den>
+                        <m:rad>
+                          <m:radPr>
+                            <m:degHide m:val="on"/>
+                            <m:ctrlPr>
+                              <a:rPr lang="en-GB" b="0" i="1" smtClean="0">
+                                <a:latin typeface="Cambria Math" panose="02040503050406030204" pitchFamily="18" charset="0"/>
+                                <a:ea typeface="Cambria Math" panose="02040503050406030204" pitchFamily="18" charset="0"/>
+                              </a:rPr>
+                            </m:ctrlPr>
+                          </m:radPr>
+                          <m:deg/>
+                          <m:e>
+                            <m:r>
+                              <a:rPr lang="en-GB" b="0" i="1" smtClean="0">
+                                <a:latin typeface="Cambria Math" panose="02040503050406030204" pitchFamily="18" charset="0"/>
+                                <a:ea typeface="Cambria Math" panose="02040503050406030204" pitchFamily="18" charset="0"/>
+                              </a:rPr>
+                              <m:t>2 </m:t>
+                            </m:r>
+                          </m:e>
+                        </m:rad>
+                        <m:r>
+                          <a:rPr lang="en-GB" b="0" i="1" smtClean="0">
+                            <a:latin typeface="Cambria Math" panose="02040503050406030204" pitchFamily="18" charset="0"/>
+                            <a:ea typeface="Cambria Math" panose="02040503050406030204" pitchFamily="18" charset="0"/>
+                          </a:rPr>
+                          <m:t>𝑅</m:t>
+                        </m:r>
+                      </m:den>
+                    </m:f>
+                    <m:r>
+                      <a:rPr lang="en-GB" b="0" i="1" smtClean="0">
+                        <a:latin typeface="Cambria Math" panose="02040503050406030204" pitchFamily="18" charset="0"/>
+                        <a:ea typeface="Cambria Math" panose="02040503050406030204" pitchFamily="18" charset="0"/>
+                      </a:rPr>
+                      <m:t>   </m:t>
+                    </m:r>
+                    <m:r>
+                      <a:rPr lang="en-GB" b="0" i="1" smtClean="0">
+                        <a:latin typeface="Cambria Math" panose="02040503050406030204" pitchFamily="18" charset="0"/>
+                        <a:ea typeface="Cambria Math" panose="02040503050406030204" pitchFamily="18" charset="0"/>
+                      </a:rPr>
+                      <m:t>  </m:t>
+                    </m:r>
+                    <m:r>
+                      <a:rPr lang="en-GB" b="0" i="1" smtClean="0">
+                        <a:latin typeface="Cambria Math" panose="02040503050406030204" pitchFamily="18" charset="0"/>
+                        <a:ea typeface="Cambria Math" panose="02040503050406030204" pitchFamily="18" charset="0"/>
+                      </a:rPr>
+                      <m:t>𝑜𝑟</m:t>
+                    </m:r>
+                    <m:r>
+                      <a:rPr lang="en-GB" b="0" i="1" smtClean="0">
+                        <a:latin typeface="Cambria Math" panose="02040503050406030204" pitchFamily="18" charset="0"/>
+                        <a:ea typeface="Cambria Math" panose="02040503050406030204" pitchFamily="18" charset="0"/>
+                      </a:rPr>
+                      <m:t>    </m:t>
+                    </m:r>
+                    <m:r>
+                      <m:rPr>
+                        <m:nor/>
+                      </m:rPr>
+                      <a:rPr lang="en-GB" b="0" i="0" smtClean="0">
+                        <a:latin typeface="Cambria Math" panose="02040503050406030204" pitchFamily="18" charset="0"/>
+                        <a:ea typeface="Cambria Math" panose="02040503050406030204" pitchFamily="18" charset="0"/>
+                      </a:rPr>
+                      <m:t>R</m:t>
+                    </m:r>
+                    <m:r>
+                      <m:rPr>
+                        <m:nor/>
+                      </m:rPr>
+                      <a:rPr lang="en-GB" b="0" i="0" smtClean="0">
+                        <a:latin typeface="Cambria Math" panose="02040503050406030204" pitchFamily="18" charset="0"/>
+                        <a:ea typeface="Cambria Math" panose="02040503050406030204" pitchFamily="18" charset="0"/>
+                      </a:rPr>
+                      <m:t>+</m:t>
+                    </m:r>
+                    <m:r>
+                      <a:rPr lang="en-GB" b="0" i="1" smtClean="0">
+                        <a:latin typeface="Cambria Math" panose="02040503050406030204" pitchFamily="18" charset="0"/>
+                        <a:ea typeface="Cambria Math" panose="02040503050406030204" pitchFamily="18" charset="0"/>
+                      </a:rPr>
+                      <m:t> </m:t>
+                    </m:r>
+                    <m:r>
+                      <m:rPr>
+                        <m:nor/>
+                      </m:rPr>
+                      <a:rPr lang="en-GB">
+                        <a:latin typeface="Cambria Math" panose="02040503050406030204" pitchFamily="18" charset="0"/>
+                        <a:ea typeface="Cambria Math" panose="02040503050406030204" pitchFamily="18" charset="0"/>
+                      </a:rPr>
+                      <m:t>offset</m:t>
+                    </m:r>
+                    <m:r>
+                      <a:rPr lang="en-GB" b="0" i="1" smtClean="0">
+                        <a:latin typeface="Cambria Math" panose="02040503050406030204" pitchFamily="18" charset="0"/>
+                        <a:ea typeface="Cambria Math" panose="02040503050406030204" pitchFamily="18" charset="0"/>
+                      </a:rPr>
+                      <m:t>=</m:t>
+                    </m:r>
+                    <m:rad>
+                      <m:radPr>
+                        <m:degHide m:val="on"/>
+                        <m:ctrlPr>
+                          <a:rPr lang="en-GB" i="1">
+                            <a:latin typeface="Cambria Math" panose="02040503050406030204" pitchFamily="18" charset="0"/>
+                            <a:ea typeface="Cambria Math" panose="02040503050406030204" pitchFamily="18" charset="0"/>
+                          </a:rPr>
+                        </m:ctrlPr>
+                      </m:radPr>
+                      <m:deg/>
+                      <m:e>
+                        <m:r>
+                          <a:rPr lang="en-GB" i="1">
+                            <a:latin typeface="Cambria Math" panose="02040503050406030204" pitchFamily="18" charset="0"/>
+                            <a:ea typeface="Cambria Math" panose="02040503050406030204" pitchFamily="18" charset="0"/>
+                          </a:rPr>
+                          <m:t>2 </m:t>
+                        </m:r>
+                      </m:e>
+                    </m:rad>
+                    <m:r>
+                      <a:rPr lang="en-GB" i="1">
+                        <a:latin typeface="Cambria Math" panose="02040503050406030204" pitchFamily="18" charset="0"/>
+                        <a:ea typeface="Cambria Math" panose="02040503050406030204" pitchFamily="18" charset="0"/>
+                      </a:rPr>
+                      <m:t>𝑅</m:t>
+                    </m:r>
+                  </m:oMath>
+                </a14:m>
+                <a:r>
+                  <a:rPr lang="en-US" dirty="0"/>
+                  <a:t> </a:t>
+                </a:r>
+                <a14:m>
+                  <m:oMath xmlns:m="http://schemas.openxmlformats.org/officeDocument/2006/math">
+                    <m:func>
+                      <m:funcPr>
+                        <m:ctrlPr>
+                          <a:rPr lang="en-GB" i="1">
+                            <a:latin typeface="Cambria Math" panose="02040503050406030204" pitchFamily="18" charset="0"/>
+                          </a:rPr>
+                        </m:ctrlPr>
+                      </m:funcPr>
+                      <m:fName>
+                        <m:r>
+                          <m:rPr>
+                            <m:sty m:val="p"/>
+                          </m:rPr>
+                          <a:rPr lang="en-GB">
+                            <a:latin typeface="Cambria Math" panose="02040503050406030204" pitchFamily="18" charset="0"/>
+                          </a:rPr>
+                          <m:t>cos</m:t>
+                        </m:r>
+                      </m:fName>
+                      <m:e>
+                        <m:d>
+                          <m:dPr>
+                            <m:ctrlPr>
+                              <a:rPr lang="en-GB" i="1">
+                                <a:latin typeface="Cambria Math" panose="02040503050406030204" pitchFamily="18" charset="0"/>
+                              </a:rPr>
+                            </m:ctrlPr>
+                          </m:dPr>
+                          <m:e>
+                            <m:r>
+                              <m:rPr>
+                                <m:nor/>
+                              </m:rPr>
+                              <a:rPr lang="el-GR" dirty="0">
+                                <a:solidFill>
+                                  <a:sysClr val="windowText" lastClr="000000"/>
+                                </a:solidFill>
+                              </a:rPr>
+                              <m:t>α</m:t>
+                            </m:r>
+                            <m:r>
+                              <m:rPr>
+                                <m:nor/>
+                              </m:rPr>
+                              <a:rPr lang="en-GB" dirty="0">
+                                <a:solidFill>
+                                  <a:sysClr val="windowText" lastClr="000000"/>
+                                </a:solidFill>
+                              </a:rPr>
+                              <m:t> − 45</m:t>
+                            </m:r>
+                            <m:r>
+                              <m:rPr>
+                                <m:nor/>
+                              </m:rPr>
+                              <a:rPr lang="de-DE" dirty="0">
+                                <a:solidFill>
+                                  <a:sysClr val="windowText" lastClr="000000"/>
+                                </a:solidFill>
+                              </a:rPr>
+                              <m:t>°</m:t>
+                            </m:r>
+                          </m:e>
+                        </m:d>
+                        <m:r>
+                          <a:rPr lang="en-GB" b="0" i="1" dirty="0" smtClean="0">
+                            <a:solidFill>
+                              <a:sysClr val="windowText" lastClr="000000"/>
+                            </a:solidFill>
+                            <a:latin typeface="Cambria Math" panose="02040503050406030204" pitchFamily="18" charset="0"/>
+                          </a:rPr>
+                          <m:t>     </m:t>
+                        </m:r>
+                        <m:r>
+                          <a:rPr lang="en-GB" b="0" i="1" dirty="0" smtClean="0">
+                            <a:solidFill>
+                              <a:sysClr val="windowText" lastClr="000000"/>
+                            </a:solidFill>
+                            <a:latin typeface="Cambria Math" panose="02040503050406030204" pitchFamily="18" charset="0"/>
+                          </a:rPr>
+                          <m:t>𝑜𝑟</m:t>
+                        </m:r>
+                        <m:r>
+                          <a:rPr lang="en-GB" b="0" i="1" dirty="0" smtClean="0">
+                            <a:solidFill>
+                              <a:sysClr val="windowText" lastClr="000000"/>
+                            </a:solidFill>
+                            <a:latin typeface="Cambria Math" panose="02040503050406030204" pitchFamily="18" charset="0"/>
+                          </a:rPr>
+                          <m:t>    </m:t>
+                        </m:r>
+                        <m:r>
+                          <m:rPr>
+                            <m:nor/>
+                          </m:rPr>
+                          <a:rPr lang="en-GB">
+                            <a:latin typeface="Cambria Math" panose="02040503050406030204" pitchFamily="18" charset="0"/>
+                            <a:ea typeface="Cambria Math" panose="02040503050406030204" pitchFamily="18" charset="0"/>
+                          </a:rPr>
+                          <m:t>offset</m:t>
+                        </m:r>
+                        <m:r>
+                          <a:rPr lang="en-GB" i="1">
+                            <a:latin typeface="Cambria Math" panose="02040503050406030204" pitchFamily="18" charset="0"/>
+                            <a:ea typeface="Cambria Math" panose="02040503050406030204" pitchFamily="18" charset="0"/>
+                          </a:rPr>
+                          <m:t>=</m:t>
+                        </m:r>
+                        <m:d>
+                          <m:dPr>
+                            <m:ctrlPr>
+                              <a:rPr lang="en-GB" b="0" i="1" smtClean="0">
+                                <a:latin typeface="Cambria Math" panose="02040503050406030204" pitchFamily="18" charset="0"/>
+                                <a:ea typeface="Cambria Math" panose="02040503050406030204" pitchFamily="18" charset="0"/>
+                              </a:rPr>
+                            </m:ctrlPr>
+                          </m:dPr>
+                          <m:e>
+                            <m:rad>
+                              <m:radPr>
+                                <m:degHide m:val="on"/>
+                                <m:ctrlPr>
+                                  <a:rPr lang="en-GB" i="1" smtClean="0">
+                                    <a:latin typeface="Cambria Math" panose="02040503050406030204" pitchFamily="18" charset="0"/>
+                                    <a:ea typeface="Cambria Math" panose="02040503050406030204" pitchFamily="18" charset="0"/>
+                                  </a:rPr>
+                                </m:ctrlPr>
+                              </m:radPr>
+                              <m:deg/>
+                              <m:e>
+                                <m:r>
+                                  <a:rPr lang="en-GB" i="1">
+                                    <a:latin typeface="Cambria Math" panose="02040503050406030204" pitchFamily="18" charset="0"/>
+                                    <a:ea typeface="Cambria Math" panose="02040503050406030204" pitchFamily="18" charset="0"/>
+                                  </a:rPr>
+                                  <m:t>2 </m:t>
+                                </m:r>
+                              </m:e>
+                            </m:rad>
+                            <m:func>
+                              <m:funcPr>
+                                <m:ctrlPr>
+                                  <a:rPr lang="en-GB" i="1">
+                                    <a:latin typeface="Cambria Math" panose="02040503050406030204" pitchFamily="18" charset="0"/>
+                                  </a:rPr>
+                                </m:ctrlPr>
+                              </m:funcPr>
+                              <m:fName>
+                                <m:r>
+                                  <m:rPr>
+                                    <m:sty m:val="p"/>
+                                  </m:rPr>
+                                  <a:rPr lang="en-GB">
+                                    <a:latin typeface="Cambria Math" panose="02040503050406030204" pitchFamily="18" charset="0"/>
+                                  </a:rPr>
+                                  <m:t>cos</m:t>
+                                </m:r>
+                              </m:fName>
+                              <m:e>
+                                <m:d>
+                                  <m:dPr>
+                                    <m:ctrlPr>
+                                      <a:rPr lang="en-GB" i="1">
+                                        <a:latin typeface="Cambria Math" panose="02040503050406030204" pitchFamily="18" charset="0"/>
+                                      </a:rPr>
+                                    </m:ctrlPr>
+                                  </m:dPr>
+                                  <m:e>
+                                    <m:r>
+                                      <m:rPr>
+                                        <m:nor/>
+                                      </m:rPr>
+                                      <a:rPr lang="el-GR" dirty="0">
+                                        <a:solidFill>
+                                          <a:sysClr val="windowText" lastClr="000000"/>
+                                        </a:solidFill>
+                                      </a:rPr>
+                                      <m:t>α</m:t>
+                                    </m:r>
+                                    <m:r>
+                                      <m:rPr>
+                                        <m:nor/>
+                                      </m:rPr>
+                                      <a:rPr lang="en-GB" dirty="0">
+                                        <a:solidFill>
+                                          <a:sysClr val="windowText" lastClr="000000"/>
+                                        </a:solidFill>
+                                      </a:rPr>
+                                      <m:t> − 45</m:t>
+                                    </m:r>
+                                    <m:r>
+                                      <m:rPr>
+                                        <m:nor/>
+                                      </m:rPr>
+                                      <a:rPr lang="de-DE" dirty="0">
+                                        <a:solidFill>
+                                          <a:sysClr val="windowText" lastClr="000000"/>
+                                        </a:solidFill>
+                                      </a:rPr>
+                                      <m:t>°</m:t>
+                                    </m:r>
+                                  </m:e>
+                                </m:d>
+                              </m:e>
+                            </m:func>
+                            <m:r>
+                              <a:rPr lang="en-GB" b="0" i="1" dirty="0" smtClean="0">
+                                <a:solidFill>
+                                  <a:sysClr val="windowText" lastClr="000000"/>
+                                </a:solidFill>
+                                <a:latin typeface="Cambria Math" panose="02040503050406030204" pitchFamily="18" charset="0"/>
+                              </a:rPr>
+                              <m:t> −1</m:t>
+                            </m:r>
+                          </m:e>
+                        </m:d>
+                        <m:r>
+                          <a:rPr lang="en-GB" b="0" i="1" smtClean="0">
+                            <a:latin typeface="Cambria Math" panose="02040503050406030204" pitchFamily="18" charset="0"/>
+                            <a:ea typeface="Cambria Math" panose="02040503050406030204" pitchFamily="18" charset="0"/>
+                          </a:rPr>
+                          <m:t> </m:t>
+                        </m:r>
+                        <m:r>
+                          <a:rPr lang="en-GB" i="1">
+                            <a:latin typeface="Cambria Math" panose="02040503050406030204" pitchFamily="18" charset="0"/>
+                            <a:ea typeface="Cambria Math" panose="02040503050406030204" pitchFamily="18" charset="0"/>
+                          </a:rPr>
+                          <m:t>𝑅</m:t>
+                        </m:r>
+                        <m:r>
+                          <m:rPr>
+                            <m:nor/>
+                          </m:rPr>
+                          <a:rPr lang="en-US" dirty="0"/>
+                          <m:t> </m:t>
+                        </m:r>
+                      </m:e>
+                    </m:func>
+                  </m:oMath>
+                </a14:m>
+                <a:endParaRPr lang="en-US" dirty="0"/>
+              </a:p>
+            </p:txBody>
+          </p:sp>
+        </mc:Choice>
+        <mc:Fallback>
+          <p:sp>
+            <p:nvSpPr>
+              <p:cNvPr id="31" name="TextBox 30">
+                <a:extLst>
+                  <a:ext uri="{FF2B5EF4-FFF2-40B4-BE49-F238E27FC236}">
+                    <a16:creationId xmlns:a16="http://schemas.microsoft.com/office/drawing/2014/main" id="{99C809CE-EDEB-3049-BFDD-ED5D4A258262}"/>
+                  </a:ext>
+                </a:extLst>
+              </p:cNvPr>
+              <p:cNvSpPr txBox="1">
+                <a:spLocks noRot="1" noChangeAspect="1" noMove="1" noResize="1" noEditPoints="1" noAdjustHandles="1" noChangeArrowheads="1" noChangeShapeType="1" noTextEdit="1"/>
+              </p:cNvSpPr>
+              <p:nvPr/>
+            </p:nvSpPr>
+            <p:spPr>
+              <a:xfrm>
+                <a:off x="1388301" y="5481290"/>
+                <a:ext cx="10150086" cy="556243"/>
+              </a:xfrm>
+              <a:prstGeom prst="rect">
+                <a:avLst/>
+              </a:prstGeom>
+              <a:blipFill>
+                <a:blip r:embed="rId2"/>
+                <a:stretch>
+                  <a:fillRect b="-11628"/>
+                </a:stretch>
+              </a:blipFill>
+            </p:spPr>
+            <p:txBody>
+              <a:bodyPr/>
+              <a:lstStyle/>
+              <a:p>
+                <a:r>
+                  <a:rPr lang="de-DE">
+                    <a:noFill/>
+                  </a:rPr>
+                  <a:t> </a:t>
+                </a:r>
+              </a:p>
+            </p:txBody>
+          </p:sp>
+        </mc:Fallback>
+      </mc:AlternateContent>
+      <p:cxnSp>
+        <p:nvCxnSpPr>
+          <p:cNvPr id="20" name="Straight Connector 19">
+            <a:extLst>
+              <a:ext uri="{FF2B5EF4-FFF2-40B4-BE49-F238E27FC236}">
+                <a16:creationId xmlns:a16="http://schemas.microsoft.com/office/drawing/2014/main" id="{54C762BD-03FC-8C48-B620-993EA8F741FE}"/>
+              </a:ext>
+            </a:extLst>
+          </p:cNvPr>
+          <p:cNvCxnSpPr>
+            <a:cxnSpLocks/>
+          </p:cNvCxnSpPr>
+          <p:nvPr/>
+        </p:nvCxnSpPr>
+        <p:spPr>
+          <a:xfrm>
+            <a:off x="5497562" y="4048131"/>
+            <a:ext cx="0" cy="653436"/>
+          </a:xfrm>
+          <a:prstGeom prst="line">
+            <a:avLst/>
+          </a:prstGeom>
+          <a:ln w="38100">
+            <a:solidFill>
+              <a:srgbClr val="FF0000"/>
+            </a:solidFill>
+          </a:ln>
+        </p:spPr>
+        <p:style>
+          <a:lnRef idx="1">
+            <a:schemeClr val="accent1"/>
+          </a:lnRef>
+          <a:fillRef idx="0">
+            <a:schemeClr val="accent1"/>
+          </a:fillRef>
+          <a:effectRef idx="0">
+            <a:schemeClr val="accent1"/>
+          </a:effectRef>
+          <a:fontRef idx="minor">
+            <a:schemeClr val="tx1"/>
+          </a:fontRef>
+        </p:style>
+      </p:cxnSp>
+      <p:sp>
+        <p:nvSpPr>
+          <p:cNvPr id="23" name="Rectangular Callout 22">
+            <a:extLst>
+              <a:ext uri="{FF2B5EF4-FFF2-40B4-BE49-F238E27FC236}">
+                <a16:creationId xmlns:a16="http://schemas.microsoft.com/office/drawing/2014/main" id="{FDEA8D38-5F24-DD42-911D-4728E756239C}"/>
+              </a:ext>
+            </a:extLst>
+          </p:cNvPr>
+          <p:cNvSpPr/>
+          <p:nvPr/>
+        </p:nvSpPr>
+        <p:spPr>
+          <a:xfrm>
+            <a:off x="6581583" y="4168563"/>
+            <a:ext cx="1101681" cy="396034"/>
+          </a:xfrm>
+          <a:prstGeom prst="wedgeRectCallout">
+            <a:avLst>
+              <a:gd name="adj1" fmla="val -142402"/>
+              <a:gd name="adj2" fmla="val 14967"/>
+            </a:avLst>
+          </a:prstGeom>
+          <a:noFill/>
+          <a:ln>
+            <a:solidFill>
+              <a:srgbClr val="FF0000"/>
+            </a:solidFill>
+          </a:ln>
+        </p:spPr>
+        <p:style>
+          <a:lnRef idx="2">
+            <a:schemeClr val="accent1">
+              <a:shade val="50000"/>
+            </a:schemeClr>
+          </a:lnRef>
+          <a:fillRef idx="1">
+            <a:schemeClr val="accent1"/>
+          </a:fillRef>
+          <a:effectRef idx="0">
+            <a:schemeClr val="accent1"/>
+          </a:effectRef>
+          <a:fontRef idx="minor">
+            <a:schemeClr val="lt1"/>
+          </a:fontRef>
+        </p:style>
+        <p:txBody>
+          <a:bodyPr rtlCol="0" anchor="ctr"/>
+          <a:lstStyle/>
+          <a:p>
+            <a:pPr algn="ctr"/>
+            <a:r>
+              <a:rPr lang="en-GB" dirty="0">
+                <a:solidFill>
+                  <a:srgbClr val="FF0000"/>
+                </a:solidFill>
+              </a:rPr>
+              <a:t>offset</a:t>
+            </a:r>
+            <a:endParaRPr lang="de-DE" dirty="0">
+              <a:solidFill>
+                <a:srgbClr val="FF0000"/>
+              </a:solidFill>
+            </a:endParaRPr>
+          </a:p>
+        </p:txBody>
+      </p:sp>
+      <p:cxnSp>
+        <p:nvCxnSpPr>
+          <p:cNvPr id="24" name="Straight Connector 23">
+            <a:extLst>
+              <a:ext uri="{FF2B5EF4-FFF2-40B4-BE49-F238E27FC236}">
+                <a16:creationId xmlns:a16="http://schemas.microsoft.com/office/drawing/2014/main" id="{3688A699-7110-444D-A17C-F7A05BD566D8}"/>
+              </a:ext>
+            </a:extLst>
+          </p:cNvPr>
+          <p:cNvCxnSpPr>
+            <a:cxnSpLocks/>
+          </p:cNvCxnSpPr>
+          <p:nvPr/>
+        </p:nvCxnSpPr>
+        <p:spPr>
+          <a:xfrm>
+            <a:off x="5502536" y="2299178"/>
+            <a:ext cx="0" cy="2394953"/>
+          </a:xfrm>
+          <a:prstGeom prst="line">
+            <a:avLst/>
+          </a:prstGeom>
+          <a:ln w="12700">
+            <a:solidFill>
+              <a:schemeClr val="tx1"/>
+            </a:solidFill>
+          </a:ln>
+        </p:spPr>
+        <p:style>
+          <a:lnRef idx="1">
+            <a:schemeClr val="accent1"/>
+          </a:lnRef>
+          <a:fillRef idx="0">
+            <a:schemeClr val="accent1"/>
+          </a:fillRef>
+          <a:effectRef idx="0">
+            <a:schemeClr val="accent1"/>
+          </a:effectRef>
+          <a:fontRef idx="minor">
+            <a:schemeClr val="tx1"/>
+          </a:fontRef>
+        </p:style>
+      </p:cxnSp>
+      <p:sp>
+        <p:nvSpPr>
+          <p:cNvPr id="28" name="Rectangular Callout 27">
+            <a:extLst>
+              <a:ext uri="{FF2B5EF4-FFF2-40B4-BE49-F238E27FC236}">
+                <a16:creationId xmlns:a16="http://schemas.microsoft.com/office/drawing/2014/main" id="{B14FD2AA-62B0-6444-A1E9-2EE4F02C2F8C}"/>
+              </a:ext>
+            </a:extLst>
+          </p:cNvPr>
+          <p:cNvSpPr/>
+          <p:nvPr/>
+        </p:nvSpPr>
+        <p:spPr>
+          <a:xfrm>
+            <a:off x="3108230" y="4018163"/>
+            <a:ext cx="457829" cy="396034"/>
+          </a:xfrm>
+          <a:prstGeom prst="wedgeRectCallout">
+            <a:avLst>
+              <a:gd name="adj1" fmla="val 215412"/>
+              <a:gd name="adj2" fmla="val 65149"/>
+            </a:avLst>
+          </a:prstGeom>
+          <a:noFill/>
+        </p:spPr>
+        <p:style>
+          <a:lnRef idx="2">
+            <a:schemeClr val="accent1">
+              <a:shade val="50000"/>
+            </a:schemeClr>
+          </a:lnRef>
+          <a:fillRef idx="1">
+            <a:schemeClr val="accent1"/>
+          </a:fillRef>
+          <a:effectRef idx="0">
+            <a:schemeClr val="accent1"/>
+          </a:effectRef>
+          <a:fontRef idx="minor">
+            <a:schemeClr val="lt1"/>
+          </a:fontRef>
+        </p:style>
+        <p:txBody>
+          <a:bodyPr rtlCol="0" anchor="ctr"/>
+          <a:lstStyle/>
+          <a:p>
+            <a:pPr algn="ctr"/>
+            <a:r>
+              <a:rPr lang="el-GR" dirty="0">
+                <a:solidFill>
+                  <a:sysClr val="windowText" lastClr="000000"/>
+                </a:solidFill>
+              </a:rPr>
+              <a:t>α</a:t>
+            </a:r>
+            <a:endParaRPr lang="de-DE" dirty="0">
+              <a:solidFill>
+                <a:sysClr val="windowText" lastClr="000000"/>
+              </a:solidFill>
+            </a:endParaRPr>
+          </a:p>
+        </p:txBody>
+      </p:sp>
+      <mc:AlternateContent xmlns:mc="http://schemas.openxmlformats.org/markup-compatibility/2006">
+        <mc:Choice xmlns:a14="http://schemas.microsoft.com/office/drawing/2010/main" Requires="a14">
+          <p:sp>
+            <p:nvSpPr>
+              <p:cNvPr id="29" name="Rectangular Callout 28">
+                <a:extLst>
+                  <a:ext uri="{FF2B5EF4-FFF2-40B4-BE49-F238E27FC236}">
+                    <a16:creationId xmlns:a16="http://schemas.microsoft.com/office/drawing/2014/main" id="{99F15428-2EF4-2F49-A2DB-26B4D9D35CCE}"/>
+                  </a:ext>
+                </a:extLst>
+              </p:cNvPr>
+              <p:cNvSpPr/>
+              <p:nvPr/>
+            </p:nvSpPr>
+            <p:spPr>
+              <a:xfrm>
+                <a:off x="4078047" y="4966406"/>
+                <a:ext cx="1460092" cy="396034"/>
+              </a:xfrm>
+              <a:prstGeom prst="wedgeRectCallout">
+                <a:avLst>
+                  <a:gd name="adj1" fmla="val 29821"/>
+                  <a:gd name="adj2" fmla="val -135755"/>
+                </a:avLst>
+              </a:prstGeom>
+              <a:noFill/>
+            </p:spPr>
+            <p:style>
+              <a:lnRef idx="2">
+                <a:schemeClr val="accent1">
+                  <a:shade val="50000"/>
+                </a:schemeClr>
+              </a:lnRef>
+              <a:fillRef idx="1">
+                <a:schemeClr val="accent1"/>
+              </a:fillRef>
+              <a:effectRef idx="0">
+                <a:schemeClr val="accent1"/>
+              </a:effectRef>
+              <a:fontRef idx="minor">
+                <a:schemeClr val="lt1"/>
+              </a:fontRef>
+            </p:style>
+            <p:txBody>
+              <a:bodyPr rtlCol="0" anchor="ctr"/>
+              <a:lstStyle/>
+              <a:p>
+                <a:pPr algn="ctr"/>
+                <a14:m>
+                  <m:oMathPara xmlns:m="http://schemas.openxmlformats.org/officeDocument/2006/math">
+                    <m:oMathParaPr>
+                      <m:jc m:val="centerGroup"/>
+                    </m:oMathParaPr>
+                    <m:oMath xmlns:m="http://schemas.openxmlformats.org/officeDocument/2006/math">
+                      <m:r>
+                        <m:rPr>
+                          <m:nor/>
+                        </m:rPr>
+                        <a:rPr lang="en-GB">
+                          <a:solidFill>
+                            <a:schemeClr val="tx1"/>
+                          </a:solidFill>
+                          <a:latin typeface="Cambria Math" panose="02040503050406030204" pitchFamily="18" charset="0"/>
+                        </a:rPr>
+                        <m:t>90</m:t>
+                      </m:r>
+                      <m:r>
+                        <m:rPr>
+                          <m:nor/>
+                        </m:rPr>
+                        <a:rPr lang="de-DE" dirty="0">
+                          <a:solidFill>
+                            <a:schemeClr val="tx1"/>
+                          </a:solidFill>
+                        </a:rPr>
+                        <m:t>°</m:t>
+                      </m:r>
+                      <m:r>
+                        <m:rPr>
+                          <m:nor/>
+                        </m:rPr>
+                        <a:rPr lang="en-GB" dirty="0">
+                          <a:solidFill>
+                            <a:schemeClr val="tx1"/>
+                          </a:solidFill>
+                        </a:rPr>
+                        <m:t>−</m:t>
+                      </m:r>
+                      <m:r>
+                        <m:rPr>
+                          <m:nor/>
+                        </m:rPr>
+                        <a:rPr lang="de-DE" dirty="0">
+                          <a:solidFill>
+                            <a:schemeClr val="tx1"/>
+                          </a:solidFill>
+                        </a:rPr>
+                        <m:t> </m:t>
+                      </m:r>
+                      <m:r>
+                        <m:rPr>
+                          <m:nor/>
+                        </m:rPr>
+                        <a:rPr lang="el-GR" dirty="0">
+                          <a:solidFill>
+                            <a:schemeClr val="tx1"/>
+                          </a:solidFill>
+                        </a:rPr>
+                        <m:t>α</m:t>
+                      </m:r>
+                    </m:oMath>
+                  </m:oMathPara>
+                </a14:m>
+                <a:endParaRPr lang="de-DE" dirty="0">
+                  <a:solidFill>
+                    <a:schemeClr val="tx1"/>
+                  </a:solidFill>
+                </a:endParaRPr>
+              </a:p>
+            </p:txBody>
+          </p:sp>
+        </mc:Choice>
+        <mc:Fallback>
+          <p:sp>
+            <p:nvSpPr>
+              <p:cNvPr id="29" name="Rectangular Callout 28">
+                <a:extLst>
+                  <a:ext uri="{FF2B5EF4-FFF2-40B4-BE49-F238E27FC236}">
+                    <a16:creationId xmlns:a16="http://schemas.microsoft.com/office/drawing/2014/main" id="{99F15428-2EF4-2F49-A2DB-26B4D9D35CCE}"/>
+                  </a:ext>
+                </a:extLst>
+              </p:cNvPr>
+              <p:cNvSpPr>
+                <a:spLocks noRot="1" noChangeAspect="1" noMove="1" noResize="1" noEditPoints="1" noAdjustHandles="1" noChangeArrowheads="1" noChangeShapeType="1" noTextEdit="1"/>
+              </p:cNvSpPr>
+              <p:nvPr/>
+            </p:nvSpPr>
+            <p:spPr>
+              <a:xfrm>
+                <a:off x="4078047" y="4966406"/>
+                <a:ext cx="1460092" cy="396034"/>
+              </a:xfrm>
+              <a:prstGeom prst="wedgeRectCallout">
+                <a:avLst>
+                  <a:gd name="adj1" fmla="val 29821"/>
+                  <a:gd name="adj2" fmla="val -135755"/>
+                </a:avLst>
+              </a:prstGeom>
+              <a:blipFill>
+                <a:blip r:embed="rId3"/>
+                <a:stretch>
+                  <a:fillRect b="-5000"/>
+                </a:stretch>
+              </a:blipFill>
+            </p:spPr>
+            <p:txBody>
+              <a:bodyPr/>
+              <a:lstStyle/>
+              <a:p>
+                <a:r>
+                  <a:rPr lang="de-DE">
+                    <a:noFill/>
+                  </a:rPr>
+                  <a:t> </a:t>
+                </a:r>
+              </a:p>
+            </p:txBody>
+          </p:sp>
+        </mc:Fallback>
+      </mc:AlternateContent>
+      <mc:AlternateContent xmlns:mc="http://schemas.openxmlformats.org/markup-compatibility/2006">
+        <mc:Choice xmlns:a14="http://schemas.microsoft.com/office/drawing/2010/main" Requires="a14">
+          <p:sp>
+            <p:nvSpPr>
+              <p:cNvPr id="30" name="Rectangular Callout 29">
+                <a:extLst>
+                  <a:ext uri="{FF2B5EF4-FFF2-40B4-BE49-F238E27FC236}">
+                    <a16:creationId xmlns:a16="http://schemas.microsoft.com/office/drawing/2014/main" id="{FA1F916E-C741-7540-8C42-8094CC46F360}"/>
+                  </a:ext>
+                </a:extLst>
+              </p:cNvPr>
+              <p:cNvSpPr/>
+              <p:nvPr/>
+            </p:nvSpPr>
+            <p:spPr>
+              <a:xfrm>
+                <a:off x="3172987" y="3420394"/>
+                <a:ext cx="650706" cy="396034"/>
+              </a:xfrm>
+              <a:prstGeom prst="wedgeRectCallout">
+                <a:avLst>
+                  <a:gd name="adj1" fmla="val 195548"/>
+                  <a:gd name="adj2" fmla="val 167100"/>
+                </a:avLst>
+              </a:prstGeom>
+              <a:noFill/>
+            </p:spPr>
+            <p:style>
+              <a:lnRef idx="2">
+                <a:schemeClr val="accent1">
+                  <a:shade val="50000"/>
+                </a:schemeClr>
+              </a:lnRef>
+              <a:fillRef idx="1">
+                <a:schemeClr val="accent1"/>
+              </a:fillRef>
+              <a:effectRef idx="0">
+                <a:schemeClr val="accent1"/>
+              </a:effectRef>
+              <a:fontRef idx="minor">
+                <a:schemeClr val="lt1"/>
+              </a:fontRef>
+            </p:style>
+            <p:txBody>
+              <a:bodyPr rtlCol="0" anchor="ctr"/>
+              <a:lstStyle/>
+              <a:p>
+                <a:pPr algn="ctr"/>
+                <a14:m>
+                  <m:oMathPara xmlns:m="http://schemas.openxmlformats.org/officeDocument/2006/math">
+                    <m:oMathParaPr>
+                      <m:jc m:val="centerGroup"/>
+                    </m:oMathParaPr>
+                    <m:oMath xmlns:m="http://schemas.openxmlformats.org/officeDocument/2006/math">
+                      <m:r>
+                        <m:rPr>
+                          <m:nor/>
+                        </m:rPr>
+                        <a:rPr lang="en-GB" b="0" i="0" smtClean="0">
+                          <a:solidFill>
+                            <a:schemeClr val="tx1"/>
+                          </a:solidFill>
+                          <a:latin typeface="Cambria Math" panose="02040503050406030204" pitchFamily="18" charset="0"/>
+                        </a:rPr>
+                        <m:t>45</m:t>
+                      </m:r>
+                      <m:r>
+                        <m:rPr>
+                          <m:nor/>
+                        </m:rPr>
+                        <a:rPr lang="de-DE" dirty="0">
+                          <a:solidFill>
+                            <a:schemeClr val="tx1"/>
+                          </a:solidFill>
+                        </a:rPr>
+                        <m:t>°</m:t>
+                      </m:r>
+                    </m:oMath>
+                  </m:oMathPara>
+                </a14:m>
+                <a:endParaRPr lang="de-DE" dirty="0">
+                  <a:solidFill>
+                    <a:sysClr val="windowText" lastClr="000000"/>
+                  </a:solidFill>
+                </a:endParaRPr>
+              </a:p>
+            </p:txBody>
+          </p:sp>
+        </mc:Choice>
+        <mc:Fallback>
+          <p:sp>
+            <p:nvSpPr>
+              <p:cNvPr id="30" name="Rectangular Callout 29">
+                <a:extLst>
+                  <a:ext uri="{FF2B5EF4-FFF2-40B4-BE49-F238E27FC236}">
+                    <a16:creationId xmlns:a16="http://schemas.microsoft.com/office/drawing/2014/main" id="{FA1F916E-C741-7540-8C42-8094CC46F360}"/>
+                  </a:ext>
+                </a:extLst>
+              </p:cNvPr>
+              <p:cNvSpPr>
+                <a:spLocks noRot="1" noChangeAspect="1" noMove="1" noResize="1" noEditPoints="1" noAdjustHandles="1" noChangeArrowheads="1" noChangeShapeType="1" noTextEdit="1"/>
+              </p:cNvSpPr>
+              <p:nvPr/>
+            </p:nvSpPr>
+            <p:spPr>
+              <a:xfrm>
+                <a:off x="3172987" y="3420394"/>
+                <a:ext cx="650706" cy="396034"/>
+              </a:xfrm>
+              <a:prstGeom prst="wedgeRectCallout">
+                <a:avLst>
+                  <a:gd name="adj1" fmla="val 195548"/>
+                  <a:gd name="adj2" fmla="val 167100"/>
+                </a:avLst>
+              </a:prstGeom>
+              <a:blipFill>
+                <a:blip r:embed="rId4"/>
+                <a:stretch>
+                  <a:fillRect/>
+                </a:stretch>
+              </a:blipFill>
+            </p:spPr>
+            <p:txBody>
+              <a:bodyPr/>
+              <a:lstStyle/>
+              <a:p>
+                <a:r>
+                  <a:rPr lang="de-DE">
+                    <a:noFill/>
+                  </a:rPr>
+                  <a:t> </a:t>
+                </a:r>
+              </a:p>
+            </p:txBody>
+          </p:sp>
+        </mc:Fallback>
+      </mc:AlternateContent>
+      <mc:AlternateContent xmlns:mc="http://schemas.openxmlformats.org/markup-compatibility/2006">
+        <mc:Choice xmlns:a14="http://schemas.microsoft.com/office/drawing/2010/main" Requires="a14">
+          <p:sp>
+            <p:nvSpPr>
+              <p:cNvPr id="34" name="Rectangular Callout 33">
+                <a:extLst>
+                  <a:ext uri="{FF2B5EF4-FFF2-40B4-BE49-F238E27FC236}">
+                    <a16:creationId xmlns:a16="http://schemas.microsoft.com/office/drawing/2014/main" id="{7EC1033B-BA89-084E-A983-64D696FF6EBC}"/>
+                  </a:ext>
+                </a:extLst>
+              </p:cNvPr>
+              <p:cNvSpPr/>
+              <p:nvPr/>
+            </p:nvSpPr>
+            <p:spPr>
+              <a:xfrm>
+                <a:off x="8154758" y="817717"/>
+                <a:ext cx="3277831" cy="785451"/>
+              </a:xfrm>
+              <a:prstGeom prst="wedgeRectCallout">
+                <a:avLst>
+                  <a:gd name="adj1" fmla="val -118725"/>
+                  <a:gd name="adj2" fmla="val 146406"/>
+                </a:avLst>
+              </a:prstGeom>
+              <a:noFill/>
+            </p:spPr>
+            <p:style>
+              <a:lnRef idx="2">
+                <a:schemeClr val="accent1">
+                  <a:shade val="50000"/>
+                </a:schemeClr>
+              </a:lnRef>
+              <a:fillRef idx="1">
+                <a:schemeClr val="accent1"/>
+              </a:fillRef>
+              <a:effectRef idx="0">
+                <a:schemeClr val="accent1"/>
+              </a:effectRef>
+              <a:fontRef idx="minor">
+                <a:schemeClr val="lt1"/>
+              </a:fontRef>
+            </p:style>
+            <p:txBody>
+              <a:bodyPr rtlCol="0" anchor="ctr"/>
+              <a:lstStyle/>
+              <a:p>
+                <a:pPr algn="ctr"/>
+                <a14:m>
+                  <m:oMath xmlns:m="http://schemas.openxmlformats.org/officeDocument/2006/math">
+                    <m:r>
+                      <m:rPr>
+                        <m:nor/>
+                      </m:rPr>
+                      <a:rPr lang="en-GB" b="0" i="0" smtClean="0">
+                        <a:solidFill>
+                          <a:schemeClr val="tx1"/>
+                        </a:solidFill>
+                        <a:latin typeface="Cambria Math" panose="02040503050406030204" pitchFamily="18" charset="0"/>
+                      </a:rPr>
+                      <m:t>180</m:t>
+                    </m:r>
+                    <m:r>
+                      <m:rPr>
+                        <m:nor/>
+                      </m:rPr>
+                      <a:rPr lang="de-DE" dirty="0">
+                        <a:solidFill>
+                          <a:schemeClr val="tx1"/>
+                        </a:solidFill>
+                      </a:rPr>
+                      <m:t>°</m:t>
+                    </m:r>
+                    <m:r>
+                      <m:rPr>
+                        <m:nor/>
+                      </m:rPr>
+                      <a:rPr lang="en-GB" b="0" i="0" dirty="0" smtClean="0">
+                        <a:solidFill>
+                          <a:schemeClr val="tx1"/>
+                        </a:solidFill>
+                      </a:rPr>
+                      <m:t> - 9</m:t>
+                    </m:r>
+                    <m:r>
+                      <m:rPr>
+                        <m:nor/>
+                      </m:rPr>
+                      <a:rPr lang="en-GB">
+                        <a:solidFill>
+                          <a:schemeClr val="tx1"/>
+                        </a:solidFill>
+                        <a:latin typeface="Cambria Math" panose="02040503050406030204" pitchFamily="18" charset="0"/>
+                      </a:rPr>
+                      <m:t>0</m:t>
+                    </m:r>
+                    <m:r>
+                      <m:rPr>
+                        <m:nor/>
+                      </m:rPr>
+                      <a:rPr lang="de-DE" dirty="0">
+                        <a:solidFill>
+                          <a:schemeClr val="tx1"/>
+                        </a:solidFill>
+                      </a:rPr>
+                      <m:t>°</m:t>
+                    </m:r>
+                    <m:r>
+                      <m:rPr>
+                        <m:nor/>
+                      </m:rPr>
+                      <a:rPr lang="en-GB" b="0" i="0" dirty="0" smtClean="0">
+                        <a:solidFill>
+                          <a:schemeClr val="tx1"/>
+                        </a:solidFill>
+                      </a:rPr>
+                      <m:t> - (</m:t>
+                    </m:r>
+                    <m:r>
+                      <m:rPr>
+                        <m:nor/>
+                      </m:rPr>
+                      <a:rPr lang="en-GB" b="0" i="0" smtClean="0">
+                        <a:solidFill>
+                          <a:schemeClr val="tx1"/>
+                        </a:solidFill>
+                        <a:latin typeface="Cambria Math" panose="02040503050406030204" pitchFamily="18" charset="0"/>
+                      </a:rPr>
+                      <m:t>45</m:t>
+                    </m:r>
+                    <m:r>
+                      <m:rPr>
+                        <m:nor/>
+                      </m:rPr>
+                      <a:rPr lang="de-DE" dirty="0">
+                        <a:solidFill>
+                          <a:schemeClr val="tx1"/>
+                        </a:solidFill>
+                      </a:rPr>
+                      <m:t>°</m:t>
+                    </m:r>
+                  </m:oMath>
+                </a14:m>
+                <a:r>
+                  <a:rPr lang="de-DE" dirty="0">
+                    <a:solidFill>
+                      <a:sysClr val="windowText" lastClr="000000"/>
+                    </a:solidFill>
+                  </a:rPr>
+                  <a:t> + </a:t>
+                </a:r>
+                <a14:m>
+                  <m:oMath xmlns:m="http://schemas.openxmlformats.org/officeDocument/2006/math">
+                    <m:r>
+                      <m:rPr>
+                        <m:nor/>
+                      </m:rPr>
+                      <a:rPr lang="en-GB" dirty="0">
+                        <a:solidFill>
+                          <a:schemeClr val="tx1"/>
+                        </a:solidFill>
+                      </a:rPr>
+                      <m:t>9</m:t>
+                    </m:r>
+                    <m:r>
+                      <m:rPr>
+                        <m:nor/>
+                      </m:rPr>
+                      <a:rPr lang="en-GB">
+                        <a:solidFill>
+                          <a:schemeClr val="tx1"/>
+                        </a:solidFill>
+                        <a:latin typeface="Cambria Math" panose="02040503050406030204" pitchFamily="18" charset="0"/>
+                      </a:rPr>
+                      <m:t>0</m:t>
+                    </m:r>
+                    <m:r>
+                      <m:rPr>
+                        <m:nor/>
+                      </m:rPr>
+                      <a:rPr lang="de-DE" dirty="0" smtClean="0">
+                        <a:solidFill>
+                          <a:schemeClr val="tx1"/>
+                        </a:solidFill>
+                      </a:rPr>
+                      <m:t>°</m:t>
+                    </m:r>
+                  </m:oMath>
+                </a14:m>
+                <a:r>
+                  <a:rPr lang="de-DE" dirty="0">
+                    <a:solidFill>
+                      <a:sysClr val="windowText" lastClr="000000"/>
+                    </a:solidFill>
+                  </a:rPr>
+                  <a:t> - </a:t>
+                </a:r>
+                <a14:m>
+                  <m:oMath xmlns:m="http://schemas.openxmlformats.org/officeDocument/2006/math">
+                    <m:r>
+                      <m:rPr>
+                        <m:nor/>
+                      </m:rPr>
+                      <a:rPr lang="el-GR" dirty="0">
+                        <a:solidFill>
+                          <a:schemeClr val="tx1"/>
+                        </a:solidFill>
+                      </a:rPr>
+                      <m:t>α</m:t>
+                    </m:r>
+                  </m:oMath>
+                </a14:m>
+                <a:r>
+                  <a:rPr lang="de-DE" dirty="0">
+                    <a:solidFill>
+                      <a:sysClr val="windowText" lastClr="000000"/>
+                    </a:solidFill>
+                  </a:rPr>
+                  <a:t>) =</a:t>
+                </a:r>
+                <a:br>
+                  <a:rPr lang="de-DE" dirty="0">
+                    <a:solidFill>
+                      <a:sysClr val="windowText" lastClr="000000"/>
+                    </a:solidFill>
+                  </a:rPr>
+                </a:br>
+                <a14:m>
+                  <m:oMath xmlns:m="http://schemas.openxmlformats.org/officeDocument/2006/math">
+                    <m:r>
+                      <m:rPr>
+                        <m:nor/>
+                      </m:rPr>
+                      <a:rPr lang="el-GR" dirty="0">
+                        <a:solidFill>
+                          <a:schemeClr val="tx1"/>
+                        </a:solidFill>
+                      </a:rPr>
+                      <m:t>α</m:t>
+                    </m:r>
+                  </m:oMath>
+                </a14:m>
+                <a:r>
+                  <a:rPr lang="de-DE" dirty="0">
+                    <a:solidFill>
+                      <a:sysClr val="windowText" lastClr="000000"/>
+                    </a:solidFill>
+                  </a:rPr>
+                  <a:t> - </a:t>
+                </a:r>
+                <a14:m>
+                  <m:oMath xmlns:m="http://schemas.openxmlformats.org/officeDocument/2006/math">
+                    <m:r>
+                      <m:rPr>
+                        <m:nor/>
+                      </m:rPr>
+                      <a:rPr lang="en-GB">
+                        <a:solidFill>
+                          <a:schemeClr val="tx1"/>
+                        </a:solidFill>
+                        <a:latin typeface="Cambria Math" panose="02040503050406030204" pitchFamily="18" charset="0"/>
+                      </a:rPr>
+                      <m:t>45</m:t>
+                    </m:r>
+                    <m:r>
+                      <m:rPr>
+                        <m:nor/>
+                      </m:rPr>
+                      <a:rPr lang="de-DE" dirty="0">
+                        <a:solidFill>
+                          <a:schemeClr val="tx1"/>
+                        </a:solidFill>
+                      </a:rPr>
+                      <m:t>°</m:t>
+                    </m:r>
+                  </m:oMath>
+                </a14:m>
+                <a:endParaRPr lang="de-DE" dirty="0">
+                  <a:solidFill>
+                    <a:sysClr val="windowText" lastClr="000000"/>
+                  </a:solidFill>
+                </a:endParaRPr>
+              </a:p>
+            </p:txBody>
+          </p:sp>
+        </mc:Choice>
+        <mc:Fallback>
+          <p:sp>
+            <p:nvSpPr>
+              <p:cNvPr id="34" name="Rectangular Callout 33">
+                <a:extLst>
+                  <a:ext uri="{FF2B5EF4-FFF2-40B4-BE49-F238E27FC236}">
+                    <a16:creationId xmlns:a16="http://schemas.microsoft.com/office/drawing/2014/main" id="{7EC1033B-BA89-084E-A983-64D696FF6EBC}"/>
+                  </a:ext>
+                </a:extLst>
+              </p:cNvPr>
+              <p:cNvSpPr>
+                <a:spLocks noRot="1" noChangeAspect="1" noMove="1" noResize="1" noEditPoints="1" noAdjustHandles="1" noChangeArrowheads="1" noChangeShapeType="1" noTextEdit="1"/>
+              </p:cNvSpPr>
+              <p:nvPr/>
+            </p:nvSpPr>
+            <p:spPr>
+              <a:xfrm>
+                <a:off x="8154758" y="817717"/>
+                <a:ext cx="3277831" cy="785451"/>
+              </a:xfrm>
+              <a:prstGeom prst="wedgeRectCallout">
+                <a:avLst>
+                  <a:gd name="adj1" fmla="val -118725"/>
+                  <a:gd name="adj2" fmla="val 146406"/>
+                </a:avLst>
+              </a:prstGeom>
+              <a:blipFill>
+                <a:blip r:embed="rId5"/>
+                <a:stretch>
+                  <a:fillRect/>
+                </a:stretch>
+              </a:blipFill>
+            </p:spPr>
+            <p:txBody>
+              <a:bodyPr/>
+              <a:lstStyle/>
+              <a:p>
+                <a:r>
+                  <a:rPr lang="de-DE">
+                    <a:noFill/>
+                  </a:rPr>
+                  <a:t> </a:t>
+                </a:r>
+              </a:p>
+            </p:txBody>
+          </p:sp>
+        </mc:Fallback>
+      </mc:AlternateContent>
+    </p:spTree>
+    <p:extLst>
+      <p:ext uri="{BB962C8B-B14F-4D97-AF65-F5344CB8AC3E}">
+        <p14:creationId xmlns:p14="http://schemas.microsoft.com/office/powerpoint/2010/main" val="2422391503"/>
       </p:ext>
     </p:extLst>
   </p:cSld>

</xml_diff>